<commit_message>
Added Module Pattern with exercise
</commit_message>
<xml_diff>
--- a/Tag 2.pptx
+++ b/Tag 2.pptx
@@ -8163,7 +8163,24 @@
             </a:pPr>
             <a:r>
               <a:rPr lang="de-DE" dirty="0" smtClean="0"/>
-              <a:t>JS ist keine klassisch objektorientierte Sprache mit einem statischen Typsystem</a:t>
+              <a:t>JS ist keine klassisch objektorientierte Sprache mit einem statischen Typsystem – das kommt erst mit ES5</a:t>
+            </a:r>
+          </a:p>
+          <a:p>
+            <a:pPr marL="0" indent="0">
+              <a:buNone/>
+            </a:pPr>
+            <a:r>
+              <a:rPr lang="de-DE" dirty="0" smtClean="0"/>
+              <a:t>Beispiele beziehen sich hier im </a:t>
+            </a:r>
+            <a:r>
+              <a:rPr lang="de-DE" smtClean="0"/>
+              <a:t>Folgenden meist auf </a:t>
+            </a:r>
+            <a:r>
+              <a:rPr lang="de-DE" dirty="0" smtClean="0"/>
+              <a:t>ES3!</a:t>
             </a:r>
           </a:p>
         </p:txBody>

</xml_diff>

<commit_message>
AMD works in the browser, aynchronous testing still not working.
</commit_message>
<xml_diff>
--- a/Tag 2.pptx
+++ b/Tag 2.pptx
@@ -8172,15 +8172,7 @@
             </a:pPr>
             <a:r>
               <a:rPr lang="de-DE" dirty="0" smtClean="0"/>
-              <a:t>Beispiele beziehen sich hier im </a:t>
-            </a:r>
-            <a:r>
-              <a:rPr lang="de-DE" smtClean="0"/>
-              <a:t>Folgenden meist auf </a:t>
-            </a:r>
-            <a:r>
-              <a:rPr lang="de-DE" dirty="0" smtClean="0"/>
-              <a:t>ES3!</a:t>
+              <a:t>Beispiele beziehen sich hier im Folgenden meist auf ES3!</a:t>
             </a:r>
           </a:p>
         </p:txBody>
@@ -15412,8 +15404,25 @@
                 <a:latin typeface="Calibri"/>
                 <a:cs typeface="Calibri"/>
               </a:rPr>
-              <a:t>-Programm, das eine Liste mit Zufallswerten füllt.</a:t>
-            </a:r>
+              <a:t>-Programm oder in einen Test </a:t>
+            </a:r>
+            <a:r>
+              <a:rPr lang="de-DE" smtClean="0">
+                <a:solidFill>
+                  <a:srgbClr val="FFFFFF"/>
+                </a:solidFill>
+                <a:latin typeface="Calibri"/>
+                <a:cs typeface="Calibri"/>
+              </a:rPr>
+              <a:t>und verwende es.</a:t>
+            </a:r>
+            <a:endParaRPr lang="de-DE" dirty="0" smtClean="0">
+              <a:solidFill>
+                <a:srgbClr val="FFFFFF"/>
+              </a:solidFill>
+              <a:latin typeface="Calibri"/>
+              <a:cs typeface="Calibri"/>
+            </a:endParaRPr>
           </a:p>
           <a:p>
             <a:pPr marL="0" indent="0">

</xml_diff>

<commit_message>
Added working AMD, changed Package names
</commit_message>
<xml_diff>
--- a/Tag 2.pptx
+++ b/Tag 2.pptx
@@ -5,10 +5,10 @@
     <p:sldMasterId id="2147483648" r:id="rId4"/>
   </p:sldMasterIdLst>
   <p:notesMasterIdLst>
-    <p:notesMasterId r:id="rId65"/>
+    <p:notesMasterId r:id="rId66"/>
   </p:notesMasterIdLst>
   <p:handoutMasterIdLst>
-    <p:handoutMasterId r:id="rId66"/>
+    <p:handoutMasterId r:id="rId67"/>
   </p:handoutMasterIdLst>
   <p:sldIdLst>
     <p:sldId id="256" r:id="rId5"/>
@@ -53,24 +53,25 @@
     <p:sldId id="408" r:id="rId44"/>
     <p:sldId id="413" r:id="rId45"/>
     <p:sldId id="414" r:id="rId46"/>
-    <p:sldId id="418" r:id="rId47"/>
-    <p:sldId id="419" r:id="rId48"/>
-    <p:sldId id="420" r:id="rId49"/>
-    <p:sldId id="439" r:id="rId50"/>
-    <p:sldId id="432" r:id="rId51"/>
-    <p:sldId id="433" r:id="rId52"/>
-    <p:sldId id="434" r:id="rId53"/>
-    <p:sldId id="435" r:id="rId54"/>
-    <p:sldId id="436" r:id="rId55"/>
-    <p:sldId id="441" r:id="rId56"/>
-    <p:sldId id="437" r:id="rId57"/>
-    <p:sldId id="438" r:id="rId58"/>
-    <p:sldId id="442" r:id="rId59"/>
-    <p:sldId id="443" r:id="rId60"/>
-    <p:sldId id="445" r:id="rId61"/>
-    <p:sldId id="446" r:id="rId62"/>
-    <p:sldId id="447" r:id="rId63"/>
-    <p:sldId id="379" r:id="rId64"/>
+    <p:sldId id="448" r:id="rId47"/>
+    <p:sldId id="418" r:id="rId48"/>
+    <p:sldId id="419" r:id="rId49"/>
+    <p:sldId id="420" r:id="rId50"/>
+    <p:sldId id="439" r:id="rId51"/>
+    <p:sldId id="432" r:id="rId52"/>
+    <p:sldId id="433" r:id="rId53"/>
+    <p:sldId id="434" r:id="rId54"/>
+    <p:sldId id="435" r:id="rId55"/>
+    <p:sldId id="436" r:id="rId56"/>
+    <p:sldId id="441" r:id="rId57"/>
+    <p:sldId id="437" r:id="rId58"/>
+    <p:sldId id="438" r:id="rId59"/>
+    <p:sldId id="442" r:id="rId60"/>
+    <p:sldId id="443" r:id="rId61"/>
+    <p:sldId id="445" r:id="rId62"/>
+    <p:sldId id="446" r:id="rId63"/>
+    <p:sldId id="447" r:id="rId64"/>
+    <p:sldId id="379" r:id="rId65"/>
   </p:sldIdLst>
   <p:sldSz cx="9144000" cy="6858000" type="screen4x3"/>
   <p:notesSz cx="7102475" cy="10234613"/>
@@ -254,7 +255,7 @@
           <a:p>
             <a:fld id="{6A764251-D831-1B46-B49E-A81E2C17AA3D}" type="datetimeFigureOut">
               <a:rPr lang="de-DE" smtClean="0"/>
-              <a:t>20/05/14</a:t>
+              <a:t>21/05/14</a:t>
             </a:fld>
             <a:endParaRPr lang="de-DE"/>
           </a:p>
@@ -421,7 +422,7 @@
             <a:fld id="{E566868E-4981-412A-A780-CE3D41660550}" type="datetimeFigureOut">
               <a:rPr lang="de-DE" smtClean="0"/>
               <a:pPr/>
-              <a:t>20/05/14</a:t>
+              <a:t>21/05/14</a:t>
             </a:fld>
             <a:endParaRPr lang="de-DE"/>
           </a:p>
@@ -1303,7 +1304,7 @@
             <a:fld id="{96B3538B-D81F-476E-A31A-F9ABC7F48F1A}" type="slidenum">
               <a:rPr lang="de-DE" smtClean="0"/>
               <a:pPr/>
-              <a:t>43</a:t>
+              <a:t>44</a:t>
             </a:fld>
             <a:endParaRPr lang="de-DE"/>
           </a:p>
@@ -1406,7 +1407,7 @@
             <a:fld id="{96B3538B-D81F-476E-A31A-F9ABC7F48F1A}" type="slidenum">
               <a:rPr lang="de-DE" smtClean="0"/>
               <a:pPr/>
-              <a:t>46</a:t>
+              <a:t>47</a:t>
             </a:fld>
             <a:endParaRPr lang="de-DE"/>
           </a:p>
@@ -1491,7 +1492,7 @@
             <a:fld id="{96B3538B-D81F-476E-A31A-F9ABC7F48F1A}" type="slidenum">
               <a:rPr lang="de-DE" smtClean="0"/>
               <a:pPr/>
-              <a:t>47</a:t>
+              <a:t>48</a:t>
             </a:fld>
             <a:endParaRPr lang="de-DE"/>
           </a:p>
@@ -1576,7 +1577,7 @@
             <a:fld id="{96B3538B-D81F-476E-A31A-F9ABC7F48F1A}" type="slidenum">
               <a:rPr lang="de-DE" smtClean="0"/>
               <a:pPr/>
-              <a:t>51</a:t>
+              <a:t>52</a:t>
             </a:fld>
             <a:endParaRPr lang="de-DE"/>
           </a:p>
@@ -1688,7 +1689,7 @@
             <a:fld id="{96B3538B-D81F-476E-A31A-F9ABC7F48F1A}" type="slidenum">
               <a:rPr lang="de-DE" smtClean="0"/>
               <a:pPr/>
-              <a:t>56</a:t>
+              <a:t>57</a:t>
             </a:fld>
             <a:endParaRPr lang="de-DE"/>
           </a:p>
@@ -1773,7 +1774,7 @@
             <a:fld id="{96B3538B-D81F-476E-A31A-F9ABC7F48F1A}" type="slidenum">
               <a:rPr lang="de-DE" smtClean="0"/>
               <a:pPr/>
-              <a:t>57</a:t>
+              <a:t>58</a:t>
             </a:fld>
             <a:endParaRPr lang="de-DE"/>
           </a:p>
@@ -1866,7 +1867,7 @@
             <a:fld id="{96B3538B-D81F-476E-A31A-F9ABC7F48F1A}" type="slidenum">
               <a:rPr lang="de-DE" smtClean="0"/>
               <a:pPr/>
-              <a:t>58</a:t>
+              <a:t>59</a:t>
             </a:fld>
             <a:endParaRPr lang="de-DE"/>
           </a:p>
@@ -2054,7 +2055,7 @@
             <a:fld id="{96B3538B-D81F-476E-A31A-F9ABC7F48F1A}" type="slidenum">
               <a:rPr lang="de-DE" smtClean="0"/>
               <a:pPr/>
-              <a:t>60</a:t>
+              <a:t>61</a:t>
             </a:fld>
             <a:endParaRPr lang="de-DE"/>
           </a:p>
@@ -5504,15 +5505,7 @@
                   <a:srgbClr val="FFFFFF"/>
                 </a:solidFill>
               </a:rPr>
-              <a:t> hin zu ES5 Objekten mit Vererbung</a:t>
-            </a:r>
-            <a:r>
-              <a:rPr lang="de-DE" dirty="0" smtClean="0">
-                <a:solidFill>
-                  <a:srgbClr val="FFFFFF"/>
-                </a:solidFill>
-              </a:rPr>
-              <a:t>.</a:t>
+              <a:t> hin zu ES5 Objekten mit Vererbung.</a:t>
             </a:r>
           </a:p>
           <a:p>
@@ -5545,11 +5538,6 @@
               </a:rPr>
               <a:t> um eine Priorität.</a:t>
             </a:r>
-            <a:endParaRPr lang="de-DE" dirty="0" smtClean="0">
-              <a:solidFill>
-                <a:srgbClr val="FFFFFF"/>
-              </a:solidFill>
-            </a:endParaRPr>
           </a:p>
           <a:p>
             <a:pPr marL="0" indent="0">
@@ -6005,7 +5993,6 @@
               <a:rPr lang="de-DE" dirty="0"/>
               <a:t>});</a:t>
             </a:r>
-            <a:endParaRPr lang="de-DE" dirty="0"/>
           </a:p>
         </p:txBody>
       </p:sp>
@@ -7911,23 +7898,7 @@
                   <a:srgbClr val="FFFFFF"/>
                 </a:solidFill>
               </a:rPr>
-              <a:t> um Setter, die den übergebenen Typ pr</a:t>
-            </a:r>
-            <a:r>
-              <a:rPr lang="de-DE" dirty="0" smtClean="0">
-                <a:solidFill>
-                  <a:srgbClr val="FFFFFF"/>
-                </a:solidFill>
-              </a:rPr>
-              <a:t>üfen</a:t>
-            </a:r>
-            <a:r>
-              <a:rPr lang="de-DE" dirty="0" smtClean="0">
-                <a:solidFill>
-                  <a:srgbClr val="FFFFFF"/>
-                </a:solidFill>
-              </a:rPr>
-              <a:t>.</a:t>
+              <a:t> um Setter, die den übergebenen Typ prüfen.</a:t>
             </a:r>
           </a:p>
           <a:p>
@@ -7975,31 +7946,7 @@
                   <a:srgbClr val="FFFFFF"/>
                 </a:solidFill>
               </a:rPr>
-              <a:t>Übung </a:t>
-            </a:r>
-            <a:r>
-              <a:rPr lang="de-DE" dirty="0" smtClean="0">
-                <a:solidFill>
-                  <a:srgbClr val="FFFFFF"/>
-                </a:solidFill>
-              </a:rPr>
-              <a:t>#9 </a:t>
-            </a:r>
-            <a:r>
-              <a:rPr lang="de-DE" dirty="0" smtClean="0">
-                <a:solidFill>
-                  <a:srgbClr val="FFFFFF"/>
-                </a:solidFill>
-              </a:rPr>
-              <a:t>-  </a:t>
-            </a:r>
-            <a:r>
-              <a:rPr lang="de-DE" dirty="0" smtClean="0">
-                <a:solidFill>
-                  <a:srgbClr val="FFFFFF"/>
-                </a:solidFill>
-              </a:rPr>
-              <a:t>Parametervalidierung</a:t>
+              <a:t>Übung #9 -  Parametervalidierung</a:t>
             </a:r>
             <a:endParaRPr lang="de-DE" dirty="0">
               <a:solidFill>
@@ -8534,7 +8481,6 @@
               <a:rPr lang="en-US" dirty="0"/>
               <a:t>;</a:t>
             </a:r>
-            <a:endParaRPr lang="en-US" dirty="0"/>
           </a:p>
         </p:txBody>
       </p:sp>
@@ -8978,18 +8924,12 @@
           <a:bodyPr/>
           <a:lstStyle/>
           <a:p>
-            <a:pPr marL="0" indent="0">
-              <a:buNone/>
-            </a:pPr>
             <a:r>
               <a:rPr lang="de-DE" dirty="0" smtClean="0"/>
               <a:t>a) erzeugt viele ähnliche Objekte oder</a:t>
             </a:r>
           </a:p>
           <a:p>
-            <a:pPr marL="0" indent="0">
-              <a:buNone/>
-            </a:pPr>
             <a:r>
               <a:rPr lang="de-DE" dirty="0" smtClean="0"/>
               <a:t>b) erzeugt Objekte, bei denen zur </a:t>
@@ -9568,7 +9508,6 @@
               <a:rPr lang="de-DE" dirty="0" smtClean="0"/>
               <a:t>); </a:t>
             </a:r>
-            <a:endParaRPr lang="de-DE" dirty="0" smtClean="0"/>
           </a:p>
           <a:p>
             <a:endParaRPr lang="de-DE" dirty="0" smtClean="0"/>
@@ -10392,11 +10331,7 @@
             </a:r>
             <a:r>
               <a:rPr lang="de-DE" dirty="0" smtClean="0"/>
-              <a:t> </a:t>
-            </a:r>
-            <a:r>
-              <a:rPr lang="de-DE" dirty="0" smtClean="0"/>
-              <a:t>Google Play.</a:t>
+              <a:t> Google Play.</a:t>
             </a:r>
             <a:r>
               <a:rPr lang="de-DE" dirty="0"/>
@@ -11430,9 +11365,6 @@
           <a:bodyPr/>
           <a:lstStyle/>
           <a:p>
-            <a:pPr marL="0" indent="0">
-              <a:buNone/>
-            </a:pPr>
             <a:r>
               <a:rPr lang="de-DE" dirty="0"/>
               <a:t>bietet eine alternative Schnittstelle zu einem </a:t>
@@ -11443,9 +11375,6 @@
             </a:r>
           </a:p>
           <a:p>
-            <a:pPr marL="0" indent="0">
-              <a:buNone/>
-            </a:pPr>
             <a:r>
               <a:rPr lang="de-DE" dirty="0"/>
               <a:t>komplexe Schnittstellen </a:t>
@@ -11456,18 +11385,12 @@
             </a:r>
           </a:p>
           <a:p>
-            <a:pPr marL="0" indent="0">
-              <a:buNone/>
-            </a:pPr>
             <a:r>
               <a:rPr lang="de-DE" dirty="0" smtClean="0"/>
               <a:t>unterschiedliche Implementierungen vereinheitlichen</a:t>
             </a:r>
           </a:p>
           <a:p>
-            <a:pPr marL="0" indent="0">
-              <a:buNone/>
-            </a:pPr>
             <a:r>
               <a:rPr lang="de-DE" dirty="0" err="1" smtClean="0"/>
               <a:t>jQuery</a:t>
@@ -11877,9 +11800,6 @@
           <a:bodyPr/>
           <a:lstStyle/>
           <a:p>
-            <a:pPr marL="0" indent="0">
-              <a:buNone/>
-            </a:pPr>
             <a:r>
               <a:rPr lang="de-DE" dirty="0" smtClean="0"/>
               <a:t>Proxy kapselt </a:t>
@@ -11894,18 +11814,12 @@
             </a:r>
           </a:p>
           <a:p>
-            <a:pPr marL="0" indent="0">
-              <a:buNone/>
-            </a:pPr>
             <a:r>
               <a:rPr lang="de-DE" dirty="0"/>
               <a:t>schützt den Zugriff auf das Objekt</a:t>
             </a:r>
           </a:p>
           <a:p>
-            <a:pPr marL="0" indent="0">
-              <a:buNone/>
-            </a:pPr>
             <a:r>
               <a:rPr lang="de-DE" dirty="0" smtClean="0"/>
               <a:t>sitzt </a:t>
@@ -11920,9 +11834,6 @@
             </a:r>
           </a:p>
           <a:p>
-            <a:pPr marL="0" indent="0">
-              <a:buNone/>
-            </a:pPr>
             <a:r>
               <a:rPr lang="de-DE" dirty="0" smtClean="0"/>
               <a:t>kann </a:t>
@@ -12454,12 +12365,13 @@
           <a:bodyPr/>
           <a:lstStyle/>
           <a:p>
-            <a:pPr marL="0" indent="0">
-              <a:buNone/>
-            </a:pPr>
-            <a:r>
-              <a:rPr lang="de-DE" dirty="0" smtClean="0"/>
-              <a:t>Auch bekannt als </a:t>
+            <a:r>
+              <a:rPr lang="de-DE" dirty="0" smtClean="0"/>
+              <a:t>auch </a:t>
+            </a:r>
+            <a:r>
+              <a:rPr lang="de-DE" dirty="0" smtClean="0"/>
+              <a:t>bekannt als </a:t>
             </a:r>
             <a:r>
               <a:rPr lang="de-DE" dirty="0" err="1" smtClean="0"/>
@@ -12476,12 +12388,13 @@
             <a:endParaRPr lang="de-DE" dirty="0" smtClean="0"/>
           </a:p>
           <a:p>
-            <a:pPr marL="0" indent="0">
-              <a:buNone/>
-            </a:pPr>
-            <a:r>
-              <a:rPr lang="de-DE" dirty="0" smtClean="0"/>
-              <a:t>Wir im Browser verwendet (</a:t>
+            <a:r>
+              <a:rPr lang="de-DE" dirty="0" smtClean="0"/>
+              <a:t>wird </a:t>
+            </a:r>
+            <a:r>
+              <a:rPr lang="de-DE" dirty="0" smtClean="0"/>
+              <a:t>im Browser verwendet (</a:t>
             </a:r>
             <a:r>
               <a:rPr lang="de-DE" dirty="0" err="1" smtClean="0"/>
@@ -12493,9 +12406,6 @@
             </a:r>
           </a:p>
           <a:p>
-            <a:pPr marL="0" indent="0">
-              <a:buNone/>
-            </a:pPr>
             <a:r>
               <a:rPr lang="de-DE" dirty="0" smtClean="0"/>
               <a:t>Publisher informieren Subscriber über Ereignisse</a:t>
@@ -12835,72 +12745,369 @@
         </p:nvSpPr>
         <p:spPr/>
         <p:txBody>
-          <a:bodyPr/>
+          <a:bodyPr>
+            <a:normAutofit fontScale="77500" lnSpcReduction="20000"/>
+          </a:bodyPr>
           <a:lstStyle/>
           <a:p>
-            <a:pPr marL="0" indent="0">
-              <a:buNone/>
-            </a:pPr>
-            <a:r>
-              <a:rPr lang="de-DE" dirty="0" smtClean="0"/>
-              <a:t>ein Template definiert Methoden</a:t>
-            </a:r>
-          </a:p>
-          <a:p>
-            <a:pPr marL="0" indent="0">
-              <a:buNone/>
-            </a:pPr>
-            <a:r>
-              <a:rPr lang="de-DE" dirty="0"/>
-              <a:t>stellt das Gerüst für konkrete Implementierungen </a:t>
-            </a:r>
-            <a:r>
-              <a:rPr lang="de-DE" dirty="0" smtClean="0"/>
-              <a:t>bereit</a:t>
-            </a:r>
-          </a:p>
-          <a:p>
-            <a:pPr marL="0" indent="0">
-              <a:buNone/>
-            </a:pPr>
-            <a:r>
-              <a:rPr lang="de-DE" dirty="0"/>
-              <a:t>abgeleiteten Objekt </a:t>
-            </a:r>
-            <a:r>
-              <a:rPr lang="de-DE" dirty="0" smtClean="0"/>
-              <a:t>überschreiben einzelne Methoden</a:t>
-            </a:r>
-          </a:p>
-          <a:p>
-            <a:pPr marL="0" indent="0">
-              <a:buNone/>
-            </a:pPr>
-            <a:r>
-              <a:rPr lang="de-DE" dirty="0"/>
-              <a:t>Inversion-</a:t>
-            </a:r>
-            <a:r>
-              <a:rPr lang="de-DE" dirty="0" err="1"/>
-              <a:t>of</a:t>
-            </a:r>
-            <a:r>
-              <a:rPr lang="de-DE" dirty="0"/>
-              <a:t>-</a:t>
-            </a:r>
-            <a:r>
-              <a:rPr lang="de-DE" dirty="0" err="1"/>
-              <a:t>Control</a:t>
+            <a:r>
+              <a:rPr lang="da-DK" dirty="0"/>
+              <a:t>// </a:t>
+            </a:r>
+            <a:r>
+              <a:rPr lang="da-DK" dirty="0" smtClean="0"/>
+              <a:t>http</a:t>
+            </a:r>
+            <a:r>
+              <a:rPr lang="da-DK" dirty="0"/>
+              <a:t>://www.html5rocks.com/en/</a:t>
+            </a:r>
+            <a:r>
+              <a:rPr lang="da-DK" dirty="0" err="1"/>
+              <a:t>tutorials</a:t>
+            </a:r>
+            <a:r>
+              <a:rPr lang="da-DK" dirty="0"/>
+              <a:t>/es7/</a:t>
+            </a:r>
+            <a:r>
+              <a:rPr lang="da-DK" dirty="0" err="1"/>
+              <a:t>observe</a:t>
+            </a:r>
+            <a:r>
+              <a:rPr lang="da-DK" dirty="0"/>
+              <a:t>/</a:t>
+            </a:r>
+            <a:endParaRPr lang="de-DE" dirty="0"/>
+          </a:p>
+          <a:p>
+            <a:r>
+              <a:rPr lang="de-DE" i="1" dirty="0" smtClean="0"/>
+              <a:t>// </a:t>
+            </a:r>
+            <a:r>
+              <a:rPr lang="de-DE" i="1" dirty="0" err="1" smtClean="0"/>
+              <a:t>Let's</a:t>
+            </a:r>
+            <a:r>
+              <a:rPr lang="de-DE" i="1" dirty="0" smtClean="0"/>
+              <a:t> </a:t>
+            </a:r>
+            <a:r>
+              <a:rPr lang="de-DE" i="1" dirty="0" err="1" smtClean="0"/>
+              <a:t>say</a:t>
+            </a:r>
+            <a:r>
+              <a:rPr lang="de-DE" i="1" dirty="0" smtClean="0"/>
+              <a:t> </a:t>
+            </a:r>
+            <a:r>
+              <a:rPr lang="de-DE" i="1" dirty="0" err="1" smtClean="0"/>
+              <a:t>we</a:t>
+            </a:r>
+            <a:r>
+              <a:rPr lang="de-DE" i="1" dirty="0" smtClean="0"/>
+              <a:t> </a:t>
+            </a:r>
+            <a:r>
+              <a:rPr lang="de-DE" i="1" dirty="0" err="1" smtClean="0"/>
+              <a:t>have</a:t>
+            </a:r>
+            <a:r>
+              <a:rPr lang="de-DE" i="1" dirty="0" smtClean="0"/>
+              <a:t> a </a:t>
+            </a:r>
+            <a:r>
+              <a:rPr lang="de-DE" i="1" dirty="0" err="1" smtClean="0"/>
+              <a:t>model</a:t>
+            </a:r>
+            <a:r>
+              <a:rPr lang="de-DE" i="1" dirty="0" smtClean="0"/>
+              <a:t> </a:t>
+            </a:r>
+            <a:r>
+              <a:rPr lang="de-DE" i="1" dirty="0" err="1" smtClean="0"/>
+              <a:t>with</a:t>
+            </a:r>
+            <a:r>
+              <a:rPr lang="de-DE" i="1" dirty="0" smtClean="0"/>
+              <a:t> </a:t>
+            </a:r>
+            <a:r>
+              <a:rPr lang="de-DE" i="1" dirty="0" err="1" smtClean="0"/>
+              <a:t>data</a:t>
             </a:r>
             <a:endParaRPr lang="de-DE" dirty="0" smtClean="0"/>
           </a:p>
           <a:p>
-            <a:pPr marL="0" indent="0">
-              <a:buNone/>
-            </a:pPr>
-            <a:r>
-              <a:rPr lang="de-DE" dirty="0"/>
-              <a:t>Entwurf von Darstellungskomponenten</a:t>
+            <a:r>
+              <a:rPr lang="da-DK" dirty="0" smtClean="0"/>
+              <a:t>var </a:t>
+            </a:r>
+            <a:r>
+              <a:rPr lang="da-DK" dirty="0"/>
+              <a:t>model = {};</a:t>
+            </a:r>
+          </a:p>
+          <a:p>
+            <a:r>
+              <a:rPr lang="da-DK" i="1" dirty="0" smtClean="0"/>
+              <a:t>// </a:t>
+            </a:r>
+            <a:r>
+              <a:rPr lang="da-DK" i="1" dirty="0" err="1" smtClean="0"/>
+              <a:t>Which</a:t>
+            </a:r>
+            <a:r>
+              <a:rPr lang="da-DK" i="1" dirty="0" smtClean="0"/>
+              <a:t> </a:t>
+            </a:r>
+            <a:r>
+              <a:rPr lang="da-DK" i="1" dirty="0" err="1" smtClean="0"/>
+              <a:t>we</a:t>
+            </a:r>
+            <a:r>
+              <a:rPr lang="da-DK" i="1" dirty="0" smtClean="0"/>
+              <a:t> </a:t>
+            </a:r>
+            <a:r>
+              <a:rPr lang="da-DK" i="1" dirty="0" err="1" smtClean="0"/>
+              <a:t>then</a:t>
+            </a:r>
+            <a:r>
+              <a:rPr lang="da-DK" i="1" dirty="0" smtClean="0"/>
+              <a:t> </a:t>
+            </a:r>
+            <a:r>
+              <a:rPr lang="da-DK" i="1" dirty="0" err="1" smtClean="0"/>
+              <a:t>observe</a:t>
+            </a:r>
+            <a:endParaRPr lang="da-DK" dirty="0" smtClean="0"/>
+          </a:p>
+          <a:p>
+            <a:r>
+              <a:rPr lang="da-DK" dirty="0" err="1" smtClean="0"/>
+              <a:t>Object.observe</a:t>
+            </a:r>
+            <a:r>
+              <a:rPr lang="da-DK" dirty="0"/>
+              <a:t>(model, </a:t>
+            </a:r>
+            <a:r>
+              <a:rPr lang="da-DK" dirty="0" err="1"/>
+              <a:t>function</a:t>
+            </a:r>
+            <a:r>
+              <a:rPr lang="da-DK" dirty="0"/>
+              <a:t>(</a:t>
+            </a:r>
+            <a:r>
+              <a:rPr lang="da-DK" dirty="0" err="1"/>
+              <a:t>changes</a:t>
+            </a:r>
+            <a:r>
+              <a:rPr lang="da-DK" dirty="0"/>
+              <a:t>){</a:t>
+            </a:r>
+          </a:p>
+          <a:p>
+            <a:endParaRPr lang="da-DK" dirty="0"/>
+          </a:p>
+          <a:p>
+            <a:r>
+              <a:rPr lang="da-DK" dirty="0" smtClean="0"/>
+              <a:t>    </a:t>
+            </a:r>
+            <a:r>
+              <a:rPr lang="da-DK" i="1" dirty="0" smtClean="0"/>
+              <a:t>// This </a:t>
+            </a:r>
+            <a:r>
+              <a:rPr lang="da-DK" i="1" dirty="0" err="1" smtClean="0"/>
+              <a:t>asynchronous</a:t>
+            </a:r>
+            <a:r>
+              <a:rPr lang="da-DK" i="1" dirty="0" smtClean="0"/>
+              <a:t> </a:t>
+            </a:r>
+            <a:r>
+              <a:rPr lang="da-DK" i="1" dirty="0" err="1" smtClean="0"/>
+              <a:t>callback</a:t>
+            </a:r>
+            <a:r>
+              <a:rPr lang="da-DK" i="1" dirty="0" smtClean="0"/>
+              <a:t> runs and </a:t>
+            </a:r>
+            <a:r>
+              <a:rPr lang="da-DK" i="1" dirty="0" err="1" smtClean="0"/>
+              <a:t>aggregates</a:t>
+            </a:r>
+            <a:r>
+              <a:rPr lang="da-DK" i="1" dirty="0" smtClean="0"/>
+              <a:t> </a:t>
+            </a:r>
+            <a:r>
+              <a:rPr lang="da-DK" i="1" dirty="0" err="1" smtClean="0"/>
+              <a:t>changes</a:t>
+            </a:r>
+            <a:endParaRPr lang="da-DK" dirty="0" smtClean="0"/>
+          </a:p>
+          <a:p>
+            <a:r>
+              <a:rPr lang="da-DK" dirty="0" smtClean="0"/>
+              <a:t>    </a:t>
+            </a:r>
+            <a:r>
+              <a:rPr lang="da-DK" dirty="0" err="1" smtClean="0"/>
+              <a:t>changes.forEach</a:t>
+            </a:r>
+            <a:r>
+              <a:rPr lang="da-DK" dirty="0" smtClean="0"/>
+              <a:t>(</a:t>
+            </a:r>
+            <a:r>
+              <a:rPr lang="da-DK" dirty="0" err="1" smtClean="0"/>
+              <a:t>function</a:t>
+            </a:r>
+            <a:r>
+              <a:rPr lang="da-DK" dirty="0" smtClean="0"/>
+              <a:t>(</a:t>
+            </a:r>
+            <a:r>
+              <a:rPr lang="da-DK" dirty="0" err="1" smtClean="0"/>
+              <a:t>change</a:t>
+            </a:r>
+            <a:r>
+              <a:rPr lang="da-DK" dirty="0" smtClean="0"/>
+              <a:t>) {</a:t>
+            </a:r>
+          </a:p>
+          <a:p>
+            <a:endParaRPr lang="da-DK" dirty="0"/>
+          </a:p>
+          <a:p>
+            <a:r>
+              <a:rPr lang="da-DK" dirty="0"/>
+              <a:t>        </a:t>
+            </a:r>
+            <a:r>
+              <a:rPr lang="da-DK" i="1" dirty="0"/>
+              <a:t>// </a:t>
+            </a:r>
+            <a:r>
+              <a:rPr lang="da-DK" i="1" dirty="0" err="1"/>
+              <a:t>Letting</a:t>
+            </a:r>
+            <a:r>
+              <a:rPr lang="da-DK" i="1" dirty="0"/>
+              <a:t> </a:t>
+            </a:r>
+            <a:r>
+              <a:rPr lang="da-DK" i="1" dirty="0" err="1"/>
+              <a:t>us</a:t>
+            </a:r>
+            <a:r>
+              <a:rPr lang="da-DK" i="1" dirty="0"/>
+              <a:t> </a:t>
+            </a:r>
+            <a:r>
+              <a:rPr lang="da-DK" i="1" dirty="0" err="1"/>
+              <a:t>know</a:t>
+            </a:r>
+            <a:r>
+              <a:rPr lang="da-DK" i="1" dirty="0"/>
+              <a:t> </a:t>
+            </a:r>
+            <a:r>
+              <a:rPr lang="da-DK" i="1" dirty="0" err="1"/>
+              <a:t>what</a:t>
+            </a:r>
+            <a:r>
+              <a:rPr lang="da-DK" i="1" dirty="0"/>
+              <a:t> changed</a:t>
+            </a:r>
+            <a:endParaRPr lang="da-DK" dirty="0"/>
+          </a:p>
+          <a:p>
+            <a:r>
+              <a:rPr lang="da-DK" dirty="0"/>
+              <a:t>        </a:t>
+            </a:r>
+            <a:r>
+              <a:rPr lang="da-DK" dirty="0" err="1"/>
+              <a:t>console.log</a:t>
+            </a:r>
+            <a:r>
+              <a:rPr lang="da-DK" dirty="0"/>
+              <a:t>(</a:t>
+            </a:r>
+            <a:r>
+              <a:rPr lang="da-DK" dirty="0" err="1"/>
+              <a:t>change.type</a:t>
+            </a:r>
+            <a:r>
+              <a:rPr lang="da-DK" dirty="0"/>
+              <a:t>, </a:t>
+            </a:r>
+            <a:r>
+              <a:rPr lang="da-DK" dirty="0" err="1"/>
+              <a:t>change.name</a:t>
+            </a:r>
+            <a:r>
+              <a:rPr lang="da-DK" dirty="0"/>
+              <a:t>, </a:t>
+            </a:r>
+            <a:r>
+              <a:rPr lang="da-DK" dirty="0" err="1"/>
+              <a:t>change.oldValue</a:t>
+            </a:r>
+            <a:r>
+              <a:rPr lang="da-DK" dirty="0"/>
+              <a:t>)</a:t>
+            </a:r>
+            <a:r>
+              <a:rPr lang="da-DK" dirty="0" smtClean="0"/>
+              <a:t>;  //</a:t>
+            </a:r>
+            <a:r>
+              <a:rPr lang="da-DK" dirty="0" err="1" smtClean="0"/>
+              <a:t>update</a:t>
+            </a:r>
+            <a:r>
+              <a:rPr lang="da-DK" dirty="0" smtClean="0"/>
+              <a:t> </a:t>
+            </a:r>
+            <a:r>
+              <a:rPr lang="da-DK" dirty="0" err="1" smtClean="0"/>
+              <a:t>property</a:t>
+            </a:r>
+            <a:r>
+              <a:rPr lang="da-DK" dirty="0" smtClean="0"/>
+              <a:t> </a:t>
+            </a:r>
+            <a:r>
+              <a:rPr lang="da-DK" dirty="0" err="1" smtClean="0"/>
+              <a:t>newvalue</a:t>
+            </a:r>
+            <a:endParaRPr lang="da-DK" dirty="0"/>
+          </a:p>
+          <a:p>
+            <a:r>
+              <a:rPr lang="da-DK" dirty="0"/>
+              <a:t>    });</a:t>
+            </a:r>
+          </a:p>
+          <a:p>
+            <a:endParaRPr lang="da-DK" dirty="0"/>
+          </a:p>
+          <a:p>
+            <a:r>
+              <a:rPr lang="da-DK" dirty="0"/>
+              <a:t>})</a:t>
+            </a:r>
+            <a:r>
+              <a:rPr lang="da-DK" dirty="0" smtClean="0"/>
+              <a:t>;</a:t>
             </a:r>
           </a:p>
         </p:txBody>
@@ -12922,11 +13129,15 @@
           <a:p>
             <a:r>
               <a:rPr lang="de-DE" dirty="0" smtClean="0"/>
-              <a:t>Template </a:t>
-            </a:r>
-            <a:r>
-              <a:rPr lang="de-DE" dirty="0" err="1" smtClean="0"/>
-              <a:t>Method</a:t>
+              <a:t>Observer in </a:t>
+            </a:r>
+            <a:r>
+              <a:rPr lang="de-DE" strike="sngStrike" dirty="0" smtClean="0"/>
+              <a:t>ES6</a:t>
+            </a:r>
+            <a:r>
+              <a:rPr lang="de-DE" dirty="0" smtClean="0"/>
+              <a:t> ES7</a:t>
             </a:r>
             <a:endParaRPr lang="de-DE" dirty="0"/>
           </a:p>
@@ -12935,21 +13146,13 @@
     </p:spTree>
     <p:extLst>
       <p:ext uri="{BB962C8B-B14F-4D97-AF65-F5344CB8AC3E}">
-        <p14:creationId xmlns:p14="http://schemas.microsoft.com/office/powerpoint/2010/main" val="98011362"/>
+        <p14:creationId xmlns:p14="http://schemas.microsoft.com/office/powerpoint/2010/main" val="1625910393"/>
       </p:ext>
     </p:extLst>
   </p:cSld>
   <p:clrMapOvr>
     <a:masterClrMapping/>
   </p:clrMapOvr>
-  <mc:AlternateContent xmlns:mc="http://schemas.openxmlformats.org/markup-compatibility/2006" xmlns:p14="http://schemas.microsoft.com/office/powerpoint/2010/main">
-    <mc:Choice Requires="p14">
-      <p:transition spd="slow" p14:dur="2000"/>
-    </mc:Choice>
-    <mc:Fallback xmlns="">
-      <p:transition xmlns:p14="http://schemas.microsoft.com/office/powerpoint/2010/main" spd="slow"/>
-    </mc:Fallback>
-  </mc:AlternateContent>
 </p:sld>
 </file>
 
@@ -12982,106 +13185,58 @@
         </p:nvSpPr>
         <p:spPr/>
         <p:txBody>
-          <a:bodyPr>
-            <a:normAutofit lnSpcReduction="10000"/>
-          </a:bodyPr>
+          <a:bodyPr/>
           <a:lstStyle/>
           <a:p>
             <a:r>
-              <a:rPr lang="en-US" dirty="0" err="1"/>
-              <a:t>var</a:t>
-            </a:r>
-            <a:r>
-              <a:rPr lang="en-US" dirty="0"/>
-              <a:t> Ad = function () {</a:t>
-            </a:r>
-          </a:p>
-          <a:p>
-            <a:r>
-              <a:rPr lang="en-US" dirty="0"/>
-              <a:t>    </a:t>
-            </a:r>
-            <a:r>
-              <a:rPr lang="en-US" dirty="0" err="1"/>
-              <a:t>this.execute</a:t>
-            </a:r>
-            <a:r>
-              <a:rPr lang="en-US" dirty="0"/>
-              <a:t> = function () {</a:t>
-            </a:r>
-          </a:p>
-          <a:p>
-            <a:r>
-              <a:rPr lang="en-US" dirty="0"/>
-              <a:t>        // do some heavy stuff</a:t>
-            </a:r>
-          </a:p>
-          <a:p>
-            <a:r>
-              <a:rPr lang="en-US" dirty="0"/>
-              <a:t>        ;</a:t>
-            </a:r>
-          </a:p>
-          <a:p>
-            <a:r>
-              <a:rPr lang="en-US" dirty="0"/>
-              <a:t>        // and display the add</a:t>
-            </a:r>
-          </a:p>
-          <a:p>
-            <a:r>
-              <a:rPr lang="en-US" dirty="0"/>
-              <a:t>        </a:t>
-            </a:r>
-            <a:r>
-              <a:rPr lang="en-US" dirty="0" err="1"/>
-              <a:t>this.display</a:t>
-            </a:r>
-            <a:r>
-              <a:rPr lang="en-US" dirty="0"/>
-              <a:t>();</a:t>
-            </a:r>
-          </a:p>
-          <a:p>
-            <a:r>
-              <a:rPr lang="en-US" dirty="0"/>
-              <a:t>    },</a:t>
-            </a:r>
-          </a:p>
-          <a:p>
-            <a:r>
-              <a:rPr lang="en-US" dirty="0"/>
-              <a:t>    </a:t>
-            </a:r>
-            <a:r>
-              <a:rPr lang="en-US" dirty="0" err="1"/>
-              <a:t>this.display</a:t>
-            </a:r>
-            <a:r>
-              <a:rPr lang="en-US" dirty="0"/>
-              <a:t> = function () {</a:t>
-            </a:r>
-          </a:p>
-          <a:p>
-            <a:r>
-              <a:rPr lang="en-US" dirty="0"/>
-              <a:t>        throw "Not implemented yet!";</a:t>
-            </a:r>
-          </a:p>
-          <a:p>
-            <a:r>
-              <a:rPr lang="en-US" dirty="0"/>
-              <a:t>    }</a:t>
-            </a:r>
-          </a:p>
-          <a:p>
-            <a:r>
-              <a:rPr lang="en-US" dirty="0"/>
-              <a:t>}; </a:t>
-            </a:r>
-          </a:p>
-          <a:p>
-            <a:endParaRPr lang="de-DE" dirty="0"/>
+              <a:rPr lang="de-DE" dirty="0" smtClean="0"/>
+              <a:t>ein Template definiert Methoden</a:t>
+            </a:r>
+          </a:p>
+          <a:p>
+            <a:r>
+              <a:rPr lang="de-DE" dirty="0"/>
+              <a:t>stellt das Gerüst für konkrete Implementierungen </a:t>
+            </a:r>
+            <a:r>
+              <a:rPr lang="de-DE" dirty="0" smtClean="0"/>
+              <a:t>bereit</a:t>
+            </a:r>
+          </a:p>
+          <a:p>
+            <a:r>
+              <a:rPr lang="de-DE" dirty="0"/>
+              <a:t>abgeleiteten Objekt </a:t>
+            </a:r>
+            <a:r>
+              <a:rPr lang="de-DE" dirty="0" smtClean="0"/>
+              <a:t>überschreiben einzelne Methoden</a:t>
+            </a:r>
+          </a:p>
+          <a:p>
+            <a:r>
+              <a:rPr lang="de-DE" dirty="0"/>
+              <a:t>Inversion-</a:t>
+            </a:r>
+            <a:r>
+              <a:rPr lang="de-DE" dirty="0" err="1"/>
+              <a:t>of</a:t>
+            </a:r>
+            <a:r>
+              <a:rPr lang="de-DE" dirty="0"/>
+              <a:t>-</a:t>
+            </a:r>
+            <a:r>
+              <a:rPr lang="de-DE" dirty="0" err="1"/>
+              <a:t>Control</a:t>
+            </a:r>
+            <a:endParaRPr lang="de-DE" dirty="0" smtClean="0"/>
+          </a:p>
+          <a:p>
+            <a:r>
+              <a:rPr lang="de-DE" dirty="0"/>
+              <a:t>Entwurf von Darstellungskomponenten</a:t>
+            </a:r>
           </a:p>
         </p:txBody>
       </p:sp>
@@ -13115,7 +13270,7 @@
     </p:spTree>
     <p:extLst>
       <p:ext uri="{BB962C8B-B14F-4D97-AF65-F5344CB8AC3E}">
-        <p14:creationId xmlns:p14="http://schemas.microsoft.com/office/powerpoint/2010/main" val="1365218095"/>
+        <p14:creationId xmlns:p14="http://schemas.microsoft.com/office/powerpoint/2010/main" val="98011362"/>
       </p:ext>
     </p:extLst>
   </p:cSld>
@@ -13163,6 +13318,186 @@
         <p:spPr/>
         <p:txBody>
           <a:bodyPr>
+            <a:normAutofit lnSpcReduction="10000"/>
+          </a:bodyPr>
+          <a:lstStyle/>
+          <a:p>
+            <a:r>
+              <a:rPr lang="en-US" dirty="0" err="1"/>
+              <a:t>var</a:t>
+            </a:r>
+            <a:r>
+              <a:rPr lang="en-US" dirty="0"/>
+              <a:t> Ad = function () {</a:t>
+            </a:r>
+          </a:p>
+          <a:p>
+            <a:r>
+              <a:rPr lang="en-US" dirty="0"/>
+              <a:t>    </a:t>
+            </a:r>
+            <a:r>
+              <a:rPr lang="en-US" dirty="0" err="1"/>
+              <a:t>this.execute</a:t>
+            </a:r>
+            <a:r>
+              <a:rPr lang="en-US" dirty="0"/>
+              <a:t> = function () {</a:t>
+            </a:r>
+          </a:p>
+          <a:p>
+            <a:r>
+              <a:rPr lang="en-US" dirty="0"/>
+              <a:t>        // do some heavy stuff</a:t>
+            </a:r>
+          </a:p>
+          <a:p>
+            <a:r>
+              <a:rPr lang="en-US" dirty="0"/>
+              <a:t>        ;</a:t>
+            </a:r>
+          </a:p>
+          <a:p>
+            <a:r>
+              <a:rPr lang="en-US" dirty="0"/>
+              <a:t>        // and display the add</a:t>
+            </a:r>
+          </a:p>
+          <a:p>
+            <a:r>
+              <a:rPr lang="en-US" dirty="0"/>
+              <a:t>        </a:t>
+            </a:r>
+            <a:r>
+              <a:rPr lang="en-US" dirty="0" err="1"/>
+              <a:t>this.display</a:t>
+            </a:r>
+            <a:r>
+              <a:rPr lang="en-US" dirty="0"/>
+              <a:t>();</a:t>
+            </a:r>
+          </a:p>
+          <a:p>
+            <a:r>
+              <a:rPr lang="en-US" dirty="0"/>
+              <a:t>    },</a:t>
+            </a:r>
+          </a:p>
+          <a:p>
+            <a:r>
+              <a:rPr lang="en-US" dirty="0"/>
+              <a:t>    </a:t>
+            </a:r>
+            <a:r>
+              <a:rPr lang="en-US" dirty="0" err="1"/>
+              <a:t>this.display</a:t>
+            </a:r>
+            <a:r>
+              <a:rPr lang="en-US" dirty="0"/>
+              <a:t> = function () {</a:t>
+            </a:r>
+          </a:p>
+          <a:p>
+            <a:r>
+              <a:rPr lang="en-US" dirty="0"/>
+              <a:t>        throw "Not implemented yet!";</a:t>
+            </a:r>
+          </a:p>
+          <a:p>
+            <a:r>
+              <a:rPr lang="en-US" dirty="0"/>
+              <a:t>    }</a:t>
+            </a:r>
+          </a:p>
+          <a:p>
+            <a:r>
+              <a:rPr lang="en-US" dirty="0"/>
+              <a:t>}; </a:t>
+            </a:r>
+          </a:p>
+          <a:p>
+            <a:endParaRPr lang="de-DE" dirty="0"/>
+          </a:p>
+        </p:txBody>
+      </p:sp>
+      <p:sp>
+        <p:nvSpPr>
+          <p:cNvPr id="3" name="Titel 2"/>
+          <p:cNvSpPr>
+            <a:spLocks noGrp="1"/>
+          </p:cNvSpPr>
+          <p:nvPr>
+            <p:ph type="title"/>
+          </p:nvPr>
+        </p:nvSpPr>
+        <p:spPr/>
+        <p:txBody>
+          <a:bodyPr/>
+          <a:lstStyle/>
+          <a:p>
+            <a:r>
+              <a:rPr lang="de-DE" dirty="0" smtClean="0"/>
+              <a:t>Template </a:t>
+            </a:r>
+            <a:r>
+              <a:rPr lang="de-DE" dirty="0" err="1" smtClean="0"/>
+              <a:t>Method</a:t>
+            </a:r>
+            <a:endParaRPr lang="de-DE" dirty="0"/>
+          </a:p>
+        </p:txBody>
+      </p:sp>
+    </p:spTree>
+    <p:extLst>
+      <p:ext uri="{BB962C8B-B14F-4D97-AF65-F5344CB8AC3E}">
+        <p14:creationId xmlns:p14="http://schemas.microsoft.com/office/powerpoint/2010/main" val="1365218095"/>
+      </p:ext>
+    </p:extLst>
+  </p:cSld>
+  <p:clrMapOvr>
+    <a:masterClrMapping/>
+  </p:clrMapOvr>
+  <mc:AlternateContent xmlns:mc="http://schemas.openxmlformats.org/markup-compatibility/2006" xmlns:p14="http://schemas.microsoft.com/office/powerpoint/2010/main">
+    <mc:Choice Requires="p14">
+      <p:transition spd="slow" p14:dur="2000"/>
+    </mc:Choice>
+    <mc:Fallback xmlns="">
+      <p:transition xmlns:p14="http://schemas.microsoft.com/office/powerpoint/2010/main" spd="slow"/>
+    </mc:Fallback>
+  </mc:AlternateContent>
+</p:sld>
+</file>
+
+<file path=ppt/slides/slide46.xml><?xml version="1.0" encoding="utf-8"?>
+<p:sld xmlns:a="http://schemas.openxmlformats.org/drawingml/2006/main" xmlns:r="http://schemas.openxmlformats.org/officeDocument/2006/relationships" xmlns:p="http://schemas.openxmlformats.org/presentationml/2006/main">
+  <p:cSld>
+    <p:spTree>
+      <p:nvGrpSpPr>
+        <p:cNvPr id="1" name=""/>
+        <p:cNvGrpSpPr/>
+        <p:nvPr/>
+      </p:nvGrpSpPr>
+      <p:grpSpPr>
+        <a:xfrm>
+          <a:off x="0" y="0"/>
+          <a:ext cx="0" cy="0"/>
+          <a:chOff x="0" y="0"/>
+          <a:chExt cx="0" cy="0"/>
+        </a:xfrm>
+      </p:grpSpPr>
+      <p:sp>
+        <p:nvSpPr>
+          <p:cNvPr id="2" name="Inhaltsplatzhalter 1"/>
+          <p:cNvSpPr>
+            <a:spLocks noGrp="1"/>
+          </p:cNvSpPr>
+          <p:nvPr>
+            <p:ph idx="1"/>
+          </p:nvPr>
+        </p:nvSpPr>
+        <p:spPr/>
+        <p:txBody>
+          <a:bodyPr>
             <a:normAutofit fontScale="77500" lnSpcReduction="20000"/>
           </a:bodyPr>
           <a:lstStyle/>
@@ -13280,11 +13615,7 @@
             </a:r>
             <a:r>
               <a:rPr lang="en-US" dirty="0"/>
-              <a:t> (</a:t>
-            </a:r>
-            <a:r>
-              <a:rPr lang="en-US" dirty="0"/>
-              <a:t>"Displays a Banner Ad");  </a:t>
+              <a:t> ("Displays a Banner Ad");  </a:t>
             </a:r>
           </a:p>
           <a:p>
@@ -13393,7 +13724,7 @@
 </p:sld>
 </file>
 
-<file path=ppt/slides/slide46.xml><?xml version="1.0" encoding="utf-8"?>
+<file path=ppt/slides/slide47.xml><?xml version="1.0" encoding="utf-8"?>
 <p:sld xmlns:a="http://schemas.openxmlformats.org/drawingml/2006/main" xmlns:r="http://schemas.openxmlformats.org/officeDocument/2006/relationships" xmlns:p="http://schemas.openxmlformats.org/presentationml/2006/main">
   <p:cSld>
     <p:spTree>
@@ -13460,7 +13791,7 @@
 </p:sld>
 </file>
 
-<file path=ppt/slides/slide47.xml><?xml version="1.0" encoding="utf-8"?>
+<file path=ppt/slides/slide48.xml><?xml version="1.0" encoding="utf-8"?>
 <p:sld xmlns:a="http://schemas.openxmlformats.org/drawingml/2006/main" xmlns:r="http://schemas.openxmlformats.org/officeDocument/2006/relationships" xmlns:p="http://schemas.openxmlformats.org/presentationml/2006/main">
   <p:cSld>
     <p:spTree>
@@ -13497,11 +13828,7 @@
             </a:pPr>
             <a:r>
               <a:rPr lang="de-DE" dirty="0" smtClean="0"/>
-              <a:t>Module werden </a:t>
-            </a:r>
-            <a:r>
-              <a:rPr lang="de-DE" dirty="0" smtClean="0"/>
-              <a:t>in JavaScript klassisch über </a:t>
+              <a:t>Module werden in JavaScript klassisch über </a:t>
             </a:r>
             <a:r>
               <a:rPr lang="de-DE" dirty="0" err="1" smtClean="0"/>
@@ -13607,158 +13934,6 @@
 </p:sld>
 </file>
 
-<file path=ppt/slides/slide48.xml><?xml version="1.0" encoding="utf-8"?>
-<p:sld xmlns:a="http://schemas.openxmlformats.org/drawingml/2006/main" xmlns:r="http://schemas.openxmlformats.org/officeDocument/2006/relationships" xmlns:p="http://schemas.openxmlformats.org/presentationml/2006/main">
-  <p:cSld>
-    <p:spTree>
-      <p:nvGrpSpPr>
-        <p:cNvPr id="1" name=""/>
-        <p:cNvGrpSpPr/>
-        <p:nvPr/>
-      </p:nvGrpSpPr>
-      <p:grpSpPr>
-        <a:xfrm>
-          <a:off x="0" y="0"/>
-          <a:ext cx="0" cy="0"/>
-          <a:chOff x="0" y="0"/>
-          <a:chExt cx="0" cy="0"/>
-        </a:xfrm>
-      </p:grpSpPr>
-      <p:sp>
-        <p:nvSpPr>
-          <p:cNvPr id="2" name="Inhaltsplatzhalter 1"/>
-          <p:cNvSpPr>
-            <a:spLocks noGrp="1"/>
-          </p:cNvSpPr>
-          <p:nvPr>
-            <p:ph idx="1"/>
-          </p:nvPr>
-        </p:nvSpPr>
-        <p:spPr/>
-        <p:txBody>
-          <a:bodyPr>
-            <a:normAutofit/>
-          </a:bodyPr>
-          <a:lstStyle/>
-          <a:p>
-            <a:r>
-              <a:rPr lang="en-US" dirty="0"/>
-              <a:t>(function () {</a:t>
-            </a:r>
-          </a:p>
-          <a:p>
-            <a:r>
-              <a:rPr lang="en-US" dirty="0"/>
-              <a:t>	// ... all </a:t>
-            </a:r>
-            <a:r>
-              <a:rPr lang="en-US" dirty="0" err="1"/>
-              <a:t>vars</a:t>
-            </a:r>
-            <a:r>
-              <a:rPr lang="en-US" dirty="0"/>
-              <a:t> and functions are in this scope </a:t>
-            </a:r>
-            <a:r>
-              <a:rPr lang="en-US" dirty="0" smtClean="0"/>
-              <a:t>only</a:t>
-            </a:r>
-          </a:p>
-          <a:p>
-            <a:r>
-              <a:rPr lang="en-US" dirty="0"/>
-              <a:t>	</a:t>
-            </a:r>
-            <a:r>
-              <a:rPr lang="en-US" dirty="0" err="1" smtClean="0"/>
-              <a:t>var</a:t>
-            </a:r>
-            <a:r>
-              <a:rPr lang="en-US" dirty="0" smtClean="0"/>
-              <a:t> x, y;</a:t>
-            </a:r>
-            <a:endParaRPr lang="en-US" dirty="0"/>
-          </a:p>
-          <a:p>
-            <a:r>
-              <a:rPr lang="en-US" dirty="0" smtClean="0"/>
-              <a:t>})();</a:t>
-            </a:r>
-            <a:endParaRPr lang="en-US" dirty="0"/>
-          </a:p>
-        </p:txBody>
-      </p:sp>
-      <p:sp>
-        <p:nvSpPr>
-          <p:cNvPr id="3" name="Titel 2"/>
-          <p:cNvSpPr>
-            <a:spLocks noGrp="1"/>
-          </p:cNvSpPr>
-          <p:nvPr>
-            <p:ph type="title"/>
-          </p:nvPr>
-        </p:nvSpPr>
-        <p:spPr/>
-        <p:txBody>
-          <a:bodyPr/>
-          <a:lstStyle/>
-          <a:p>
-            <a:r>
-              <a:rPr lang="de-DE" dirty="0" smtClean="0"/>
-              <a:t>Module – Immediate </a:t>
-            </a:r>
-            <a:r>
-              <a:rPr lang="de-DE" dirty="0" err="1" smtClean="0"/>
-              <a:t>Functions</a:t>
-            </a:r>
-            <a:r>
-              <a:rPr lang="de-DE" dirty="0" smtClean="0"/>
-              <a:t> </a:t>
-            </a:r>
-            <a:r>
-              <a:rPr lang="de-DE" dirty="0" err="1" smtClean="0"/>
-              <a:t>with</a:t>
-            </a:r>
-            <a:r>
-              <a:rPr lang="de-DE" dirty="0" smtClean="0"/>
-              <a:t> </a:t>
-            </a:r>
-            <a:r>
-              <a:rPr lang="de-DE" dirty="0" err="1" smtClean="0"/>
-              <a:t>Closures</a:t>
-            </a:r>
-            <a:endParaRPr lang="de-DE" dirty="0"/>
-          </a:p>
-        </p:txBody>
-      </p:sp>
-    </p:spTree>
-    <p:extLst>
-      <p:ext uri="{BB962C8B-B14F-4D97-AF65-F5344CB8AC3E}">
-        <p14:creationId xmlns:p14="http://schemas.microsoft.com/office/powerpoint/2010/main" val="4089056548"/>
-      </p:ext>
-    </p:extLst>
-  </p:cSld>
-  <p:clrMapOvr>
-    <a:masterClrMapping/>
-  </p:clrMapOvr>
-  <mc:AlternateContent xmlns:mc="http://schemas.openxmlformats.org/markup-compatibility/2006" xmlns:p14="http://schemas.microsoft.com/office/powerpoint/2010/main">
-    <mc:Choice Requires="p14">
-      <p:transition spd="slow" p14:dur="2000"/>
-    </mc:Choice>
-    <mc:Fallback xmlns="">
-      <p:transition xmlns:p14="http://schemas.microsoft.com/office/powerpoint/2010/main" spd="slow"/>
-    </mc:Fallback>
-  </mc:AlternateContent>
-  <p:timing>
-    <p:tnLst>
-      <p:par>
-        <p:cTn xmlns:p14="http://schemas.microsoft.com/office/powerpoint/2010/main" id="1" dur="indefinite" restart="never" nodeType="tmRoot"/>
-      </p:par>
-    </p:tnLst>
-  </p:timing>
-</p:sld>
-</file>
-
 <file path=ppt/slides/slide49.xml><?xml version="1.0" encoding="utf-8"?>
 <p:sld xmlns:a="http://schemas.openxmlformats.org/drawingml/2006/main" xmlns:r="http://schemas.openxmlformats.org/officeDocument/2006/relationships" xmlns:p="http://schemas.openxmlformats.org/presentationml/2006/main">
   <p:cSld>
@@ -13789,23 +13964,11 @@
         <p:spPr/>
         <p:txBody>
           <a:bodyPr>
-            <a:normAutofit fontScale="92500" lnSpcReduction="20000"/>
+            <a:normAutofit/>
           </a:bodyPr>
           <a:lstStyle/>
           <a:p>
             <a:r>
-              <a:rPr lang="en-US" dirty="0" err="1"/>
-              <a:t>var</a:t>
-            </a:r>
-            <a:r>
-              <a:rPr lang="en-US" dirty="0"/>
-              <a:t> </a:t>
-            </a:r>
-            <a:r>
-              <a:rPr lang="en-US" dirty="0" smtClean="0"/>
-              <a:t>module = </a:t>
-            </a:r>
-            <a:r>
               <a:rPr lang="en-US" dirty="0"/>
               <a:t>(function () {</a:t>
             </a:r>
@@ -13813,27 +13976,19 @@
           <a:p>
             <a:r>
               <a:rPr lang="en-US" dirty="0"/>
-              <a:t>	</a:t>
+              <a:t>	// ... all </a:t>
             </a:r>
             <a:r>
               <a:rPr lang="en-US" dirty="0" err="1"/>
-              <a:t>var</a:t>
+              <a:t>vars</a:t>
             </a:r>
             <a:r>
               <a:rPr lang="en-US" dirty="0"/>
-              <a:t> </a:t>
-            </a:r>
-            <a:r>
-              <a:rPr lang="en-US" dirty="0" err="1" smtClean="0"/>
-              <a:t>myModule</a:t>
+              <a:t> and functions are in this scope </a:t>
             </a:r>
             <a:r>
               <a:rPr lang="en-US" dirty="0" smtClean="0"/>
-              <a:t> </a:t>
-            </a:r>
-            <a:r>
-              <a:rPr lang="en-US" dirty="0"/>
-              <a:t>= {},</a:t>
+              <a:t>only</a:t>
             </a:r>
           </a:p>
           <a:p>
@@ -13843,101 +13998,11 @@
             </a:r>
             <a:r>
               <a:rPr lang="en-US" dirty="0" err="1" smtClean="0"/>
-              <a:t>privateVariable</a:t>
+              <a:t>var</a:t>
             </a:r>
             <a:r>
               <a:rPr lang="en-US" dirty="0" smtClean="0"/>
-              <a:t> </a:t>
-            </a:r>
-            <a:r>
-              <a:rPr lang="en-US" dirty="0"/>
-              <a:t>= 1;</a:t>
-            </a:r>
-          </a:p>
-          <a:p>
-            <a:r>
-              <a:rPr lang="en-US" dirty="0"/>
-              <a:t>	function </a:t>
-            </a:r>
-            <a:r>
-              <a:rPr lang="en-US" dirty="0" err="1"/>
-              <a:t>privateMethod</a:t>
-            </a:r>
-            <a:r>
-              <a:rPr lang="en-US" dirty="0"/>
-              <a:t>() {</a:t>
-            </a:r>
-          </a:p>
-          <a:p>
-            <a:r>
-              <a:rPr lang="en-US" dirty="0"/>
-              <a:t>		// ...</a:t>
-            </a:r>
-          </a:p>
-          <a:p>
-            <a:r>
-              <a:rPr lang="en-US" dirty="0"/>
-              <a:t>	}</a:t>
-            </a:r>
-          </a:p>
-          <a:p>
-            <a:r>
-              <a:rPr lang="en-US" dirty="0"/>
-              <a:t>	</a:t>
-            </a:r>
-            <a:r>
-              <a:rPr lang="en-US" dirty="0" err="1" smtClean="0"/>
-              <a:t>myModule.getVar</a:t>
-            </a:r>
-            <a:r>
-              <a:rPr lang="en-US" dirty="0" smtClean="0"/>
-              <a:t> = </a:t>
-            </a:r>
-            <a:r>
-              <a:rPr lang="en-US" dirty="0"/>
-              <a:t>function () {</a:t>
-            </a:r>
-          </a:p>
-          <a:p>
-            <a:r>
-              <a:rPr lang="en-US" dirty="0"/>
-              <a:t>		</a:t>
-            </a:r>
-            <a:r>
-              <a:rPr lang="en-US" dirty="0" smtClean="0"/>
-              <a:t>return </a:t>
-            </a:r>
-            <a:r>
-              <a:rPr lang="en-US" dirty="0" err="1" smtClean="0"/>
-              <a:t>privateVariable</a:t>
-            </a:r>
-            <a:r>
-              <a:rPr lang="en-US" dirty="0" smtClean="0"/>
-              <a:t>;</a:t>
-            </a:r>
-            <a:endParaRPr lang="en-US" dirty="0"/>
-          </a:p>
-          <a:p>
-            <a:r>
-              <a:rPr lang="en-US" dirty="0"/>
-              <a:t>	};</a:t>
-            </a:r>
-          </a:p>
-          <a:p>
-            <a:endParaRPr lang="en-US" dirty="0"/>
-          </a:p>
-          <a:p>
-            <a:r>
-              <a:rPr lang="en-US" dirty="0"/>
-              <a:t>	return </a:t>
-            </a:r>
-            <a:r>
-              <a:rPr lang="en-US" dirty="0" err="1" smtClean="0"/>
-              <a:t>myModule</a:t>
-            </a:r>
-            <a:r>
-              <a:rPr lang="en-US" dirty="0" smtClean="0"/>
-              <a:t>;</a:t>
+              <a:t> x, y;</a:t>
             </a:r>
             <a:endParaRPr lang="en-US" dirty="0"/>
           </a:p>
@@ -13967,7 +14032,27 @@
           <a:p>
             <a:r>
               <a:rPr lang="de-DE" dirty="0" smtClean="0"/>
-              <a:t>Module – Export</a:t>
+              <a:t>Module – Immediate </a:t>
+            </a:r>
+            <a:r>
+              <a:rPr lang="de-DE" dirty="0" err="1" smtClean="0"/>
+              <a:t>Functions</a:t>
+            </a:r>
+            <a:r>
+              <a:rPr lang="de-DE" dirty="0" smtClean="0"/>
+              <a:t> </a:t>
+            </a:r>
+            <a:r>
+              <a:rPr lang="de-DE" dirty="0" err="1" smtClean="0"/>
+              <a:t>with</a:t>
+            </a:r>
+            <a:r>
+              <a:rPr lang="de-DE" dirty="0" smtClean="0"/>
+              <a:t> </a:t>
+            </a:r>
+            <a:r>
+              <a:rPr lang="de-DE" dirty="0" err="1" smtClean="0"/>
+              <a:t>Closures</a:t>
             </a:r>
             <a:endParaRPr lang="de-DE" dirty="0"/>
           </a:p>
@@ -13976,7 +14061,7 @@
     </p:spTree>
     <p:extLst>
       <p:ext uri="{BB962C8B-B14F-4D97-AF65-F5344CB8AC3E}">
-        <p14:creationId xmlns:p14="http://schemas.microsoft.com/office/powerpoint/2010/main" val="3974371478"/>
+        <p14:creationId xmlns:p14="http://schemas.microsoft.com/office/powerpoint/2010/main" val="4089056548"/>
       </p:ext>
     </p:extLst>
   </p:cSld>
@@ -14040,9 +14125,59 @@
             </a:pPr>
             <a:r>
               <a:rPr lang="de-DE" dirty="0" smtClean="0"/>
-              <a:t>In ES6 wird – für Java-Entwickler – alles ganz einfach werden.</a:t>
-            </a:r>
-            <a:endParaRPr lang="de-DE" dirty="0"/>
+              <a:t>In ES6 wird – für Java-Entwickler – alles ganz einfach </a:t>
+            </a:r>
+            <a:r>
+              <a:rPr lang="de-DE" dirty="0" smtClean="0"/>
+              <a:t>werden. </a:t>
+            </a:r>
+            <a:br>
+              <a:rPr lang="de-DE" dirty="0" smtClean="0"/>
+            </a:br>
+            <a:r>
+              <a:rPr lang="de-DE" dirty="0" smtClean="0"/>
+              <a:t/>
+            </a:r>
+            <a:br>
+              <a:rPr lang="de-DE" dirty="0" smtClean="0"/>
+            </a:br>
+            <a:r>
+              <a:rPr lang="de-DE" sz="1200" dirty="0" smtClean="0"/>
+              <a:t>(Im Moment ist man froh, wenn man </a:t>
+            </a:r>
+            <a:r>
+              <a:rPr lang="de-DE" sz="1200" dirty="0"/>
+              <a:t>ES5 verwenden </a:t>
+            </a:r>
+            <a:r>
+              <a:rPr lang="de-DE" sz="1200" dirty="0" smtClean="0"/>
+              <a:t>darf (IE9+) </a:t>
+            </a:r>
+            <a:r>
+              <a:rPr lang="de-DE" sz="1200" dirty="0"/>
+              <a:t>-&gt; http://</a:t>
+            </a:r>
+            <a:r>
+              <a:rPr lang="de-DE" sz="1200" dirty="0" err="1"/>
+              <a:t>kangax.github.io</a:t>
+            </a:r>
+            <a:r>
+              <a:rPr lang="de-DE" sz="1200" dirty="0"/>
+              <a:t>/</a:t>
+            </a:r>
+            <a:r>
+              <a:rPr lang="de-DE" sz="1200" dirty="0" err="1"/>
+              <a:t>compat-table</a:t>
+            </a:r>
+            <a:r>
+              <a:rPr lang="de-DE" sz="1200" dirty="0"/>
+              <a:t>/es5</a:t>
+            </a:r>
+            <a:r>
+              <a:rPr lang="de-DE" sz="1200" smtClean="0"/>
+              <a:t>/)</a:t>
+            </a:r>
+            <a:endParaRPr lang="de-DE" sz="1200" dirty="0"/>
           </a:p>
         </p:txBody>
       </p:sp>
@@ -14119,35 +14254,61 @@
         <p:spPr/>
         <p:txBody>
           <a:bodyPr>
-            <a:normAutofit/>
+            <a:normAutofit fontScale="92500" lnSpcReduction="20000"/>
           </a:bodyPr>
           <a:lstStyle/>
           <a:p>
             <a:r>
+              <a:rPr lang="en-US" dirty="0" err="1"/>
+              <a:t>var</a:t>
+            </a:r>
+            <a:r>
               <a:rPr lang="en-US" dirty="0"/>
-              <a:t>(function ($, </a:t>
+              <a:t> </a:t>
+            </a:r>
+            <a:r>
+              <a:rPr lang="en-US" dirty="0" smtClean="0"/>
+              <a:t>module = </a:t>
+            </a:r>
+            <a:r>
+              <a:rPr lang="en-US" dirty="0"/>
+              <a:t>(function () {</a:t>
+            </a:r>
+          </a:p>
+          <a:p>
+            <a:r>
+              <a:rPr lang="en-US" dirty="0"/>
+              <a:t>	</a:t>
+            </a:r>
+            <a:r>
+              <a:rPr lang="en-US" dirty="0" err="1"/>
+              <a:t>var</a:t>
+            </a:r>
+            <a:r>
+              <a:rPr lang="en-US" dirty="0"/>
+              <a:t> </a:t>
             </a:r>
             <a:r>
               <a:rPr lang="en-US" dirty="0" err="1" smtClean="0"/>
-              <a:t>addressService</a:t>
+              <a:t>myModule</a:t>
             </a:r>
             <a:r>
               <a:rPr lang="en-US" dirty="0" smtClean="0"/>
-              <a:t>) </a:t>
+              <a:t> </a:t>
             </a:r>
             <a:r>
               <a:rPr lang="en-US" dirty="0"/>
-              <a:t>{</a:t>
+              <a:t>= {},</a:t>
             </a:r>
           </a:p>
           <a:p>
             <a:r>
               <a:rPr lang="en-US" dirty="0"/>
-              <a:t>	// now have access to </a:t>
+              <a:t>	</a:t>
             </a:r>
             <a:r>
               <a:rPr lang="en-US" dirty="0" err="1" smtClean="0"/>
-              <a:t>jQuery</a:t>
+              <a:t>privateVariable</a:t>
             </a:r>
             <a:r>
               <a:rPr lang="en-US" dirty="0" smtClean="0"/>
@@ -14155,65 +14316,102 @@
             </a:r>
             <a:r>
               <a:rPr lang="en-US" dirty="0"/>
-              <a:t>(as $) and </a:t>
+              <a:t>= 1;</a:t>
+            </a:r>
+          </a:p>
+          <a:p>
+            <a:r>
+              <a:rPr lang="en-US" dirty="0"/>
+              <a:t>	function </a:t>
+            </a:r>
+            <a:r>
+              <a:rPr lang="en-US" dirty="0" err="1"/>
+              <a:t>privateMethod</a:t>
+            </a:r>
+            <a:r>
+              <a:rPr lang="en-US" dirty="0"/>
+              <a:t>() {</a:t>
+            </a:r>
+          </a:p>
+          <a:p>
+            <a:r>
+              <a:rPr lang="en-US" dirty="0"/>
+              <a:t>		// ...</a:t>
+            </a:r>
+          </a:p>
+          <a:p>
+            <a:r>
+              <a:rPr lang="en-US" dirty="0"/>
+              <a:t>	}</a:t>
+            </a:r>
+          </a:p>
+          <a:p>
+            <a:r>
+              <a:rPr lang="en-US" dirty="0"/>
+              <a:t>	</a:t>
+            </a:r>
+            <a:r>
+              <a:rPr lang="en-US" dirty="0" err="1" smtClean="0"/>
+              <a:t>myModule.getVar</a:t>
             </a:r>
             <a:r>
               <a:rPr lang="en-US" dirty="0" smtClean="0"/>
-              <a:t/>
-            </a:r>
-            <a:br>
+              <a:t> = </a:t>
+            </a:r>
+            <a:r>
+              <a:rPr lang="en-US" dirty="0"/>
+              <a:t>function () {</a:t>
+            </a:r>
+          </a:p>
+          <a:p>
+            <a:r>
+              <a:rPr lang="en-US" dirty="0"/>
+              <a:t>		</a:t>
+            </a:r>
+            <a:r>
               <a:rPr lang="en-US" dirty="0" smtClean="0"/>
-            </a:br>
+              <a:t>return </a:t>
+            </a:r>
+            <a:r>
+              <a:rPr lang="en-US" dirty="0" err="1" smtClean="0"/>
+              <a:t>privateVariable</a:t>
+            </a:r>
             <a:r>
               <a:rPr lang="en-US" dirty="0" smtClean="0"/>
-              <a:t>	// </a:t>
+              <a:t>;</a:t>
+            </a:r>
+            <a:endParaRPr lang="en-US" dirty="0"/>
+          </a:p>
+          <a:p>
+            <a:r>
+              <a:rPr lang="en-US" dirty="0"/>
+              <a:t>	};</a:t>
+            </a:r>
+          </a:p>
+          <a:p>
+            <a:endParaRPr lang="en-US" dirty="0"/>
+          </a:p>
+          <a:p>
+            <a:r>
+              <a:rPr lang="en-US" dirty="0"/>
+              <a:t>	return </a:t>
             </a:r>
             <a:r>
               <a:rPr lang="en-US" dirty="0" err="1" smtClean="0"/>
-              <a:t>customerAddressService</a:t>
+              <a:t>myModule</a:t>
             </a:r>
             <a:r>
               <a:rPr lang="en-US" dirty="0" smtClean="0"/>
-              <a:t> as </a:t>
-            </a:r>
-            <a:r>
-              <a:rPr lang="en-US" dirty="0" err="1" smtClean="0"/>
-              <a:t>addressService</a:t>
-            </a:r>
+              <a:t>;</a:t>
+            </a:r>
+            <a:endParaRPr lang="en-US" dirty="0"/>
+          </a:p>
+          <a:p>
             <a:r>
               <a:rPr lang="en-US" dirty="0" smtClean="0"/>
-              <a:t> in </a:t>
-            </a:r>
-            <a:r>
-              <a:rPr lang="en-US" dirty="0"/>
-              <a:t>this code</a:t>
-            </a:r>
-          </a:p>
-          <a:p>
-            <a:r>
-              <a:rPr lang="en-US" dirty="0"/>
-              <a:t>}(</a:t>
-            </a:r>
-            <a:r>
-              <a:rPr lang="en-US" dirty="0" err="1"/>
-              <a:t>jQuery</a:t>
-            </a:r>
-            <a:r>
-              <a:rPr lang="en-US" dirty="0"/>
-              <a:t>, </a:t>
-            </a:r>
-            <a:r>
-              <a:rPr lang="en-US" dirty="0" err="1" smtClean="0"/>
-              <a:t>customerAddressService</a:t>
-            </a:r>
-            <a:r>
-              <a:rPr lang="en-US" dirty="0" smtClean="0"/>
-              <a:t>)</a:t>
-            </a:r>
-            <a:r>
-              <a:rPr lang="en-US" dirty="0"/>
-              <a:t>)</a:t>
-            </a:r>
+              <a:t>})();</a:t>
+            </a:r>
+            <a:endParaRPr lang="en-US" dirty="0"/>
           </a:p>
         </p:txBody>
       </p:sp>
@@ -14234,7 +14432,7 @@
           <a:p>
             <a:r>
               <a:rPr lang="de-DE" dirty="0" smtClean="0"/>
-              <a:t>Module – Import</a:t>
+              <a:t>Module – Export</a:t>
             </a:r>
             <a:endParaRPr lang="de-DE" dirty="0"/>
           </a:p>
@@ -14243,7 +14441,7 @@
     </p:spTree>
     <p:extLst>
       <p:ext uri="{BB962C8B-B14F-4D97-AF65-F5344CB8AC3E}">
-        <p14:creationId xmlns:p14="http://schemas.microsoft.com/office/powerpoint/2010/main" val="3729870708"/>
+        <p14:creationId xmlns:p14="http://schemas.microsoft.com/office/powerpoint/2010/main" val="3974371478"/>
       </p:ext>
     </p:extLst>
   </p:cSld>
@@ -14297,30 +14495,102 @@
         </p:nvSpPr>
         <p:spPr/>
         <p:txBody>
-          <a:bodyPr/>
+          <a:bodyPr>
+            <a:normAutofit/>
+          </a:bodyPr>
           <a:lstStyle/>
           <a:p>
-            <a:pPr marL="0" indent="0">
-              <a:buNone/>
-            </a:pPr>
-            <a:r>
-              <a:rPr lang="de-DE" dirty="0" smtClean="0"/>
-              <a:t>Gliederung von Funktionalitäten sind über </a:t>
-            </a:r>
-            <a:r>
-              <a:rPr lang="de-DE" dirty="0" err="1" smtClean="0"/>
-              <a:t>Namespaces</a:t>
-            </a:r>
-            <a:r>
-              <a:rPr lang="de-DE" dirty="0" smtClean="0"/>
-              <a:t> möglich.</a:t>
-            </a:r>
-          </a:p>
-          <a:p>
-            <a:pPr marL="0" indent="0">
-              <a:buNone/>
-            </a:pPr>
-            <a:endParaRPr lang="de-DE" dirty="0"/>
+            <a:r>
+              <a:rPr lang="en-US" dirty="0"/>
+              <a:t>(function ($, </a:t>
+            </a:r>
+            <a:r>
+              <a:rPr lang="en-US" dirty="0" err="1" smtClean="0"/>
+              <a:t>addressService</a:t>
+            </a:r>
+            <a:r>
+              <a:rPr lang="en-US" dirty="0" smtClean="0"/>
+              <a:t>) </a:t>
+            </a:r>
+            <a:r>
+              <a:rPr lang="en-US" dirty="0"/>
+              <a:t>{</a:t>
+            </a:r>
+          </a:p>
+          <a:p>
+            <a:r>
+              <a:rPr lang="en-US" dirty="0"/>
+              <a:t>	// now have access to </a:t>
+            </a:r>
+            <a:r>
+              <a:rPr lang="en-US" dirty="0" err="1" smtClean="0"/>
+              <a:t>jQuery</a:t>
+            </a:r>
+            <a:r>
+              <a:rPr lang="en-US" dirty="0" smtClean="0"/>
+              <a:t> </a:t>
+            </a:r>
+            <a:r>
+              <a:rPr lang="en-US" dirty="0"/>
+              <a:t>(as $) and </a:t>
+            </a:r>
+            <a:r>
+              <a:rPr lang="en-US" dirty="0" smtClean="0"/>
+              <a:t/>
+            </a:r>
+            <a:br>
+              <a:rPr lang="en-US" dirty="0" smtClean="0"/>
+            </a:br>
+            <a:r>
+              <a:rPr lang="en-US" dirty="0" smtClean="0"/>
+              <a:t>	// </a:t>
+            </a:r>
+            <a:r>
+              <a:rPr lang="en-US" dirty="0" err="1" smtClean="0"/>
+              <a:t>customerAddressService</a:t>
+            </a:r>
+            <a:r>
+              <a:rPr lang="en-US" dirty="0" smtClean="0"/>
+              <a:t> as </a:t>
+            </a:r>
+            <a:r>
+              <a:rPr lang="en-US" dirty="0" err="1" smtClean="0"/>
+              <a:t>addressService</a:t>
+            </a:r>
+            <a:r>
+              <a:rPr lang="en-US" dirty="0" smtClean="0"/>
+              <a:t> in </a:t>
+            </a:r>
+            <a:r>
+              <a:rPr lang="en-US" dirty="0"/>
+              <a:t>this code</a:t>
+            </a:r>
+          </a:p>
+          <a:p>
+            <a:r>
+              <a:rPr lang="en-US" dirty="0"/>
+              <a:t>}(</a:t>
+            </a:r>
+            <a:r>
+              <a:rPr lang="en-US" dirty="0" err="1"/>
+              <a:t>jQuery</a:t>
+            </a:r>
+            <a:r>
+              <a:rPr lang="en-US" dirty="0"/>
+              <a:t>, </a:t>
+            </a:r>
+            <a:r>
+              <a:rPr lang="en-US" dirty="0" err="1" smtClean="0"/>
+              <a:t>customerAddressService</a:t>
+            </a:r>
+            <a:r>
+              <a:rPr lang="en-US" dirty="0" smtClean="0"/>
+              <a:t>)</a:t>
+            </a:r>
+            <a:r>
+              <a:rPr lang="en-US" dirty="0"/>
+              <a:t>)</a:t>
+            </a:r>
           </a:p>
         </p:txBody>
       </p:sp>
@@ -14340,8 +14610,8 @@
           <a:lstStyle/>
           <a:p>
             <a:r>
-              <a:rPr lang="de-DE" dirty="0" err="1" smtClean="0"/>
-              <a:t>Namespaces</a:t>
+              <a:rPr lang="de-DE" dirty="0" smtClean="0"/>
+              <a:t>Module – Import</a:t>
             </a:r>
             <a:endParaRPr lang="de-DE" dirty="0"/>
           </a:p>
@@ -14350,7 +14620,7 @@
     </p:spTree>
     <p:extLst>
       <p:ext uri="{BB962C8B-B14F-4D97-AF65-F5344CB8AC3E}">
-        <p14:creationId xmlns:p14="http://schemas.microsoft.com/office/powerpoint/2010/main" val="350714877"/>
+        <p14:creationId xmlns:p14="http://schemas.microsoft.com/office/powerpoint/2010/main" val="3729870708"/>
       </p:ext>
     </p:extLst>
   </p:cSld>
@@ -14404,210 +14674,30 @@
         </p:nvSpPr>
         <p:spPr/>
         <p:txBody>
-          <a:bodyPr>
-            <a:normAutofit/>
-          </a:bodyPr>
+          <a:bodyPr/>
           <a:lstStyle/>
           <a:p>
-            <a:r>
-              <a:rPr lang="de-DE" dirty="0" smtClean="0"/>
-              <a:t> </a:t>
+            <a:pPr marL="0" indent="0">
+              <a:buNone/>
+            </a:pPr>
+            <a:r>
+              <a:rPr lang="de-DE" dirty="0" smtClean="0"/>
+              <a:t>Gliederung von Funktionalitäten sind über </a:t>
             </a:r>
             <a:r>
               <a:rPr lang="de-DE" dirty="0" err="1" smtClean="0"/>
-              <a:t>var</a:t>
-            </a:r>
-            <a:r>
-              <a:rPr lang="de-DE" dirty="0" smtClean="0"/>
-              <a:t> de = {</a:t>
-            </a:r>
-            <a:br>
-              <a:rPr lang="de-DE" dirty="0" smtClean="0"/>
-            </a:br>
-            <a:r>
-              <a:rPr lang="de-DE" dirty="0" smtClean="0"/>
-              <a:t> </a:t>
-            </a:r>
-            <a:r>
-              <a:rPr lang="de-DE" dirty="0"/>
-              <a:t>	</a:t>
-            </a:r>
-            <a:r>
-              <a:rPr lang="de-DE" dirty="0" smtClean="0"/>
-              <a:t>	</a:t>
-            </a:r>
-            <a:r>
-              <a:rPr lang="de-DE" dirty="0"/>
-              <a:t> </a:t>
-            </a:r>
-            <a:r>
-              <a:rPr lang="de-DE" dirty="0" smtClean="0"/>
-              <a:t> </a:t>
-            </a:r>
-            <a:r>
-              <a:rPr lang="de-DE" dirty="0" err="1" smtClean="0"/>
-              <a:t>immonet</a:t>
-            </a:r>
-            <a:r>
-              <a:rPr lang="de-DE" dirty="0" smtClean="0"/>
-              <a:t> : {</a:t>
-            </a:r>
+              <a:t>Namespaces</a:t>
+            </a:r>
+            <a:r>
+              <a:rPr lang="de-DE" dirty="0" smtClean="0"/>
+              <a:t> möglich.</a:t>
+            </a:r>
+          </a:p>
+          <a:p>
+            <a:pPr marL="0" indent="0">
+              <a:buNone/>
+            </a:pPr>
             <a:endParaRPr lang="de-DE" dirty="0"/>
-          </a:p>
-          <a:p>
-            <a:pPr lvl="1"/>
-            <a:r>
-              <a:rPr lang="de-DE" dirty="0" smtClean="0"/>
-              <a:t>    </a:t>
-            </a:r>
-            <a:r>
-              <a:rPr lang="de-DE" dirty="0" smtClean="0"/>
-              <a:t>	</a:t>
-            </a:r>
-            <a:r>
-              <a:rPr lang="de-DE" dirty="0" smtClean="0"/>
-              <a:t>Person : </a:t>
-            </a:r>
-            <a:r>
-              <a:rPr lang="de-DE" dirty="0" err="1" smtClean="0"/>
-              <a:t>function</a:t>
-            </a:r>
-            <a:r>
-              <a:rPr lang="de-DE" dirty="0" smtClean="0"/>
-              <a:t> </a:t>
-            </a:r>
-            <a:r>
-              <a:rPr lang="de-DE" dirty="0" smtClean="0"/>
-              <a:t>(</a:t>
-            </a:r>
-            <a:r>
-              <a:rPr lang="de-DE" dirty="0" err="1"/>
-              <a:t>name</a:t>
-            </a:r>
-            <a:r>
-              <a:rPr lang="de-DE" dirty="0"/>
-              <a:t>) {</a:t>
-            </a:r>
-          </a:p>
-          <a:p>
-            <a:pPr lvl="1"/>
-            <a:r>
-              <a:rPr lang="de-DE" dirty="0" smtClean="0"/>
-              <a:t>         </a:t>
-            </a:r>
-            <a:r>
-              <a:rPr lang="de-DE" dirty="0" err="1"/>
-              <a:t>this.name</a:t>
-            </a:r>
-            <a:r>
-              <a:rPr lang="de-DE" dirty="0"/>
-              <a:t> = </a:t>
-            </a:r>
-            <a:r>
-              <a:rPr lang="de-DE" dirty="0" err="1"/>
-              <a:t>name</a:t>
-            </a:r>
-            <a:r>
-              <a:rPr lang="de-DE" dirty="0"/>
-              <a:t>;</a:t>
-            </a:r>
-          </a:p>
-          <a:p>
-            <a:pPr lvl="1"/>
-            <a:r>
-              <a:rPr lang="de-DE" dirty="0" smtClean="0"/>
-              <a:t>     </a:t>
-            </a:r>
-            <a:r>
-              <a:rPr lang="de-DE" dirty="0" smtClean="0"/>
-              <a:t>	}</a:t>
-            </a:r>
-          </a:p>
-          <a:p>
-            <a:pPr lvl="1"/>
-            <a:r>
-              <a:rPr lang="de-DE" dirty="0" smtClean="0"/>
-              <a:t>  	}</a:t>
-            </a:r>
-            <a:r>
-              <a:rPr lang="de-DE" dirty="0"/>
-              <a:t/>
-            </a:r>
-            <a:br>
-              <a:rPr lang="de-DE" dirty="0"/>
-            </a:br>
-            <a:r>
-              <a:rPr lang="de-DE" dirty="0" smtClean="0"/>
-              <a:t>}</a:t>
-            </a:r>
-            <a:r>
-              <a:rPr lang="de-DE" dirty="0" smtClean="0"/>
-              <a:t>;</a:t>
-            </a:r>
-            <a:endParaRPr lang="de-DE" dirty="0"/>
-          </a:p>
-          <a:p>
-            <a:endParaRPr lang="de-DE" dirty="0"/>
-          </a:p>
-          <a:p>
-            <a:r>
-              <a:rPr lang="de-DE" dirty="0" err="1"/>
-              <a:t>var</a:t>
-            </a:r>
-            <a:r>
-              <a:rPr lang="de-DE" dirty="0"/>
-              <a:t> </a:t>
-            </a:r>
-            <a:r>
-              <a:rPr lang="de-DE" dirty="0" err="1" smtClean="0"/>
-              <a:t>me</a:t>
-            </a:r>
-            <a:r>
-              <a:rPr lang="de-DE" dirty="0" smtClean="0"/>
-              <a:t> </a:t>
-            </a:r>
-            <a:r>
-              <a:rPr lang="de-DE" dirty="0"/>
-              <a:t>= </a:t>
-            </a:r>
-            <a:r>
-              <a:rPr lang="de-DE" dirty="0" err="1"/>
-              <a:t>new</a:t>
-            </a:r>
-            <a:r>
-              <a:rPr lang="de-DE" dirty="0"/>
-              <a:t> </a:t>
-            </a:r>
-            <a:r>
-              <a:rPr lang="de-DE" dirty="0" err="1"/>
-              <a:t>de.immonet.Person</a:t>
-            </a:r>
-            <a:r>
-              <a:rPr lang="de-DE" dirty="0"/>
-              <a:t>('Oliver')</a:t>
-            </a:r>
-            <a:r>
-              <a:rPr lang="de-DE" dirty="0" smtClean="0"/>
-              <a:t>;</a:t>
-            </a:r>
-          </a:p>
-          <a:p>
-            <a:r>
-              <a:rPr lang="de-DE" dirty="0" err="1" smtClean="0"/>
-              <a:t>console.log</a:t>
-            </a:r>
-            <a:r>
-              <a:rPr lang="de-DE" dirty="0" smtClean="0"/>
-              <a:t>(</a:t>
-            </a:r>
-            <a:r>
-              <a:rPr lang="de-DE" dirty="0" err="1" smtClean="0"/>
-              <a:t>me.name</a:t>
-            </a:r>
-            <a:r>
-              <a:rPr lang="de-DE" dirty="0"/>
-              <a:t>);</a:t>
-            </a:r>
           </a:p>
         </p:txBody>
       </p:sp>
@@ -14630,10 +14720,6 @@
               <a:rPr lang="de-DE" dirty="0" err="1" smtClean="0"/>
               <a:t>Namespaces</a:t>
             </a:r>
-            <a:r>
-              <a:rPr lang="de-DE" dirty="0" smtClean="0"/>
-              <a:t> - Verwenden normale Objekte</a:t>
-            </a:r>
             <a:endParaRPr lang="de-DE" dirty="0"/>
           </a:p>
         </p:txBody>
@@ -14641,13 +14727,21 @@
     </p:spTree>
     <p:extLst>
       <p:ext uri="{BB962C8B-B14F-4D97-AF65-F5344CB8AC3E}">
-        <p14:creationId xmlns:p14="http://schemas.microsoft.com/office/powerpoint/2010/main" val="4235978113"/>
+        <p14:creationId xmlns:p14="http://schemas.microsoft.com/office/powerpoint/2010/main" val="350714877"/>
       </p:ext>
     </p:extLst>
   </p:cSld>
   <p:clrMapOvr>
     <a:masterClrMapping/>
   </p:clrMapOvr>
+  <mc:AlternateContent xmlns:mc="http://schemas.openxmlformats.org/markup-compatibility/2006" xmlns:p14="http://schemas.microsoft.com/office/powerpoint/2010/main">
+    <mc:Choice Requires="p14">
+      <p:transition spd="slow" p14:dur="2000"/>
+    </mc:Choice>
+    <mc:Fallback xmlns="">
+      <p:transition xmlns:p14="http://schemas.microsoft.com/office/powerpoint/2010/main" spd="slow"/>
+    </mc:Fallback>
+  </mc:AlternateContent>
   <p:timing>
     <p:tnLst>
       <p:par>
@@ -14688,185 +14782,188 @@
         <p:spPr/>
         <p:txBody>
           <a:bodyPr>
-            <a:normAutofit fontScale="77500" lnSpcReduction="20000"/>
+            <a:normAutofit/>
           </a:bodyPr>
           <a:lstStyle/>
           <a:p>
             <a:r>
-              <a:rPr lang="en-US" dirty="0" err="1"/>
+              <a:rPr lang="de-DE" dirty="0" smtClean="0"/>
+              <a:t> </a:t>
+            </a:r>
+            <a:r>
+              <a:rPr lang="de-DE" dirty="0" err="1" smtClean="0"/>
               <a:t>var</a:t>
             </a:r>
             <a:r>
-              <a:rPr lang="en-US" dirty="0"/>
-              <a:t> </a:t>
-            </a:r>
-            <a:r>
-              <a:rPr lang="en-US" dirty="0" smtClean="0"/>
-              <a:t>de= de |</a:t>
-            </a:r>
-            <a:r>
-              <a:rPr lang="en-US" dirty="0"/>
-              <a:t>| {};</a:t>
-            </a:r>
-          </a:p>
-          <a:p>
-            <a:r>
-              <a:rPr lang="en-US" dirty="0" err="1" smtClean="0"/>
-              <a:t>de.immonet</a:t>
-            </a:r>
-            <a:r>
-              <a:rPr lang="en-US" dirty="0" smtClean="0"/>
+              <a:rPr lang="de-DE" dirty="0" smtClean="0"/>
+              <a:t> de = {</a:t>
+            </a:r>
+            <a:br>
+              <a:rPr lang="de-DE" dirty="0" smtClean="0"/>
+            </a:br>
+            <a:r>
+              <a:rPr lang="de-DE" dirty="0" smtClean="0"/>
+              <a:t> </a:t>
+            </a:r>
+            <a:r>
+              <a:rPr lang="de-DE" dirty="0"/>
+              <a:t>	</a:t>
+            </a:r>
+            <a:r>
+              <a:rPr lang="de-DE" dirty="0" smtClean="0"/>
+              <a:t>	</a:t>
+            </a:r>
+            <a:r>
+              <a:rPr lang="de-DE" dirty="0"/>
+              <a:t> </a:t>
+            </a:r>
+            <a:r>
+              <a:rPr lang="de-DE" dirty="0" smtClean="0"/>
+              <a:t> </a:t>
+            </a:r>
+            <a:r>
+              <a:rPr lang="de-DE" dirty="0" err="1" smtClean="0"/>
+              <a:t>immonet</a:t>
+            </a:r>
+            <a:r>
+              <a:rPr lang="de-DE" dirty="0" smtClean="0"/>
+              <a:t> : {</a:t>
+            </a:r>
+            <a:endParaRPr lang="de-DE" dirty="0"/>
+          </a:p>
+          <a:p>
+            <a:pPr lvl="1"/>
+            <a:r>
+              <a:rPr lang="de-DE" dirty="0" smtClean="0"/>
+              <a:t>    	Person : </a:t>
+            </a:r>
+            <a:r>
+              <a:rPr lang="de-DE" dirty="0" err="1" smtClean="0"/>
+              <a:t>function</a:t>
+            </a:r>
+            <a:r>
+              <a:rPr lang="de-DE" dirty="0" smtClean="0"/>
+              <a:t> (</a:t>
+            </a:r>
+            <a:r>
+              <a:rPr lang="de-DE" dirty="0" err="1"/>
+              <a:t>name</a:t>
+            </a:r>
+            <a:r>
+              <a:rPr lang="de-DE" dirty="0"/>
+              <a:t>) {</a:t>
+            </a:r>
+          </a:p>
+          <a:p>
+            <a:pPr lvl="1"/>
+            <a:r>
+              <a:rPr lang="de-DE" dirty="0" smtClean="0"/>
+              <a:t>         </a:t>
+            </a:r>
+            <a:r>
+              <a:rPr lang="de-DE" dirty="0" err="1"/>
+              <a:t>this.name</a:t>
+            </a:r>
+            <a:r>
+              <a:rPr lang="de-DE" dirty="0"/>
               <a:t> = </a:t>
             </a:r>
             <a:r>
-              <a:rPr lang="en-US" dirty="0"/>
-              <a:t>{};</a:t>
-            </a:r>
-          </a:p>
-          <a:p>
-            <a:r>
-              <a:rPr lang="en-US" dirty="0" err="1" smtClean="0"/>
-              <a:t>de.immonet.person</a:t>
-            </a:r>
-            <a:r>
-              <a:rPr lang="en-US" dirty="0" smtClean="0"/>
-              <a:t> </a:t>
-            </a:r>
-            <a:r>
-              <a:rPr lang="en-US" dirty="0"/>
-              <a:t>= {};</a:t>
-            </a:r>
-          </a:p>
-          <a:p>
-            <a:r>
-              <a:rPr lang="en-US" dirty="0"/>
-              <a:t>(function (person) {</a:t>
-            </a:r>
-          </a:p>
-          <a:p>
-            <a:r>
-              <a:rPr lang="en-US" dirty="0"/>
-              <a:t>    // Constructor</a:t>
-            </a:r>
-          </a:p>
-          <a:p>
-            <a:r>
-              <a:rPr lang="en-US" dirty="0"/>
-              <a:t>    function Person(name) {</a:t>
-            </a:r>
-          </a:p>
-          <a:p>
-            <a:r>
-              <a:rPr lang="en-US" dirty="0"/>
-              <a:t>        </a:t>
-            </a:r>
-            <a:r>
-              <a:rPr lang="en-US" dirty="0" err="1"/>
-              <a:t>this.name</a:t>
-            </a:r>
-            <a:r>
-              <a:rPr lang="en-US" dirty="0"/>
-              <a:t> = name;</a:t>
-            </a:r>
-          </a:p>
-          <a:p>
-            <a:r>
-              <a:rPr lang="en-US" dirty="0"/>
-              <a:t>    }</a:t>
-            </a:r>
-          </a:p>
-          <a:p>
-            <a:r>
-              <a:rPr lang="en-US" dirty="0" smtClean="0"/>
-              <a:t>	  /</a:t>
-            </a:r>
-            <a:r>
-              <a:rPr lang="en-US" dirty="0"/>
-              <a:t>/ Export </a:t>
-            </a:r>
-            <a:r>
-              <a:rPr lang="en-US" dirty="0" err="1" smtClean="0"/>
-              <a:t>einer</a:t>
-            </a:r>
-            <a:r>
-              <a:rPr lang="en-US" dirty="0" smtClean="0"/>
-              <a:t> Factory</a:t>
-            </a:r>
-            <a:r>
-              <a:rPr lang="en-US" dirty="0"/>
-              <a:t>-</a:t>
-            </a:r>
-            <a:r>
-              <a:rPr lang="en-US" dirty="0" err="1"/>
-              <a:t>Methode</a:t>
-            </a:r>
-            <a:endParaRPr lang="en-US" dirty="0"/>
-          </a:p>
-          <a:p>
-            <a:r>
-              <a:rPr lang="en-US" dirty="0"/>
-              <a:t>    </a:t>
-            </a:r>
-            <a:r>
-              <a:rPr lang="en-US" dirty="0" err="1" smtClean="0"/>
-              <a:t>person.create</a:t>
-            </a:r>
-            <a:r>
-              <a:rPr lang="en-US" dirty="0" smtClean="0"/>
-              <a:t> </a:t>
-            </a:r>
-            <a:r>
-              <a:rPr lang="en-US" dirty="0"/>
-              <a:t>= function </a:t>
-            </a:r>
-            <a:r>
-              <a:rPr lang="en-US" dirty="0" smtClean="0"/>
+              <a:rPr lang="de-DE" dirty="0" err="1"/>
+              <a:t>name</a:t>
+            </a:r>
+            <a:r>
+              <a:rPr lang="de-DE" dirty="0"/>
+              <a:t>;</a:t>
+            </a:r>
+          </a:p>
+          <a:p>
+            <a:pPr lvl="1"/>
+            <a:r>
+              <a:rPr lang="de-DE" dirty="0" smtClean="0"/>
+              <a:t>     	}</a:t>
+            </a:r>
+          </a:p>
+          <a:p>
+            <a:pPr lvl="1"/>
+            <a:r>
+              <a:rPr lang="de-DE" dirty="0" smtClean="0"/>
+              <a:t>  	}</a:t>
+            </a:r>
+            <a:r>
+              <a:rPr lang="de-DE" dirty="0"/>
+              <a:t/>
+            </a:r>
+            <a:br>
+              <a:rPr lang="de-DE" dirty="0"/>
+            </a:br>
+            <a:r>
+              <a:rPr lang="de-DE" dirty="0" smtClean="0"/>
+              <a:t>};</a:t>
+            </a:r>
+            <a:endParaRPr lang="de-DE" dirty="0"/>
+          </a:p>
+          <a:p>
+            <a:endParaRPr lang="de-DE" dirty="0"/>
+          </a:p>
+          <a:p>
+            <a:r>
+              <a:rPr lang="de-DE" dirty="0" err="1"/>
+              <a:t>var</a:t>
+            </a:r>
+            <a:r>
+              <a:rPr lang="de-DE" dirty="0"/>
+              <a:t> </a:t>
+            </a:r>
+            <a:r>
+              <a:rPr lang="de-DE" dirty="0" err="1" smtClean="0"/>
+              <a:t>me</a:t>
+            </a:r>
+            <a:r>
+              <a:rPr lang="de-DE" dirty="0" smtClean="0"/>
+              <a:t> </a:t>
+            </a:r>
+            <a:r>
+              <a:rPr lang="de-DE" dirty="0"/>
+              <a:t>= </a:t>
+            </a:r>
+            <a:r>
+              <a:rPr lang="de-DE" dirty="0" err="1"/>
+              <a:t>new</a:t>
+            </a:r>
+            <a:r>
+              <a:rPr lang="de-DE" dirty="0"/>
+              <a:t> </a:t>
+            </a:r>
+            <a:r>
+              <a:rPr lang="de-DE" dirty="0" err="1"/>
+              <a:t>de.immonet.Person</a:t>
+            </a:r>
+            <a:r>
+              <a:rPr lang="de-DE" dirty="0"/>
+              <a:t>('Oliver')</a:t>
+            </a:r>
+            <a:r>
+              <a:rPr lang="de-DE" dirty="0" smtClean="0"/>
+              <a:t>;</a:t>
+            </a:r>
+          </a:p>
+          <a:p>
+            <a:r>
+              <a:rPr lang="de-DE" dirty="0" err="1" smtClean="0"/>
+              <a:t>console.log</a:t>
+            </a:r>
+            <a:r>
+              <a:rPr lang="de-DE" dirty="0" smtClean="0"/>
               <a:t>(</a:t>
             </a:r>
             <a:r>
-              <a:rPr lang="en-US" dirty="0"/>
-              <a:t>name) {</a:t>
-            </a:r>
-          </a:p>
-          <a:p>
-            <a:r>
-              <a:rPr lang="en-US" dirty="0"/>
-              <a:t>        return new Person(name);</a:t>
-            </a:r>
-          </a:p>
-          <a:p>
-            <a:r>
-              <a:rPr lang="en-US" dirty="0"/>
-              <a:t>    }</a:t>
-            </a:r>
-          </a:p>
-          <a:p>
-            <a:r>
-              <a:rPr lang="en-US" dirty="0" smtClean="0"/>
-              <a:t>;</a:t>
-            </a:r>
-            <a:endParaRPr lang="en-US" dirty="0"/>
-          </a:p>
-          <a:p>
-            <a:r>
-              <a:rPr lang="en-US" dirty="0"/>
-              <a:t>})</a:t>
-            </a:r>
-            <a:r>
-              <a:rPr lang="en-US" dirty="0" smtClean="0"/>
-              <a:t>(</a:t>
-            </a:r>
-            <a:r>
-              <a:rPr lang="en-US" dirty="0" err="1" smtClean="0"/>
-              <a:t>de.immonet.person</a:t>
-            </a:r>
-            <a:r>
-              <a:rPr lang="en-US" dirty="0" smtClean="0"/>
-              <a:t>)</a:t>
-            </a:r>
-            <a:r>
-              <a:rPr lang="en-US" dirty="0"/>
-              <a:t>;</a:t>
+              <a:rPr lang="de-DE" dirty="0" err="1" smtClean="0"/>
+              <a:t>me.name</a:t>
+            </a:r>
+            <a:r>
+              <a:rPr lang="de-DE" dirty="0"/>
+              <a:t>);</a:t>
             </a:r>
           </a:p>
         </p:txBody>
@@ -14892,7 +14989,7 @@
             </a:r>
             <a:r>
               <a:rPr lang="de-DE" dirty="0" smtClean="0"/>
-              <a:t> – Definition mit Factory</a:t>
+              <a:t> - Verwenden normale Objekte</a:t>
             </a:r>
             <a:endParaRPr lang="de-DE" dirty="0"/>
           </a:p>
@@ -14901,21 +14998,13 @@
     </p:spTree>
     <p:extLst>
       <p:ext uri="{BB962C8B-B14F-4D97-AF65-F5344CB8AC3E}">
-        <p14:creationId xmlns:p14="http://schemas.microsoft.com/office/powerpoint/2010/main" val="966032260"/>
+        <p14:creationId xmlns:p14="http://schemas.microsoft.com/office/powerpoint/2010/main" val="4235978113"/>
       </p:ext>
     </p:extLst>
   </p:cSld>
   <p:clrMapOvr>
     <a:masterClrMapping/>
   </p:clrMapOvr>
-  <mc:AlternateContent xmlns:mc="http://schemas.openxmlformats.org/markup-compatibility/2006" xmlns:p14="http://schemas.microsoft.com/office/powerpoint/2010/main">
-    <mc:Choice Requires="p14">
-      <p:transition spd="slow" p14:dur="2000"/>
-    </mc:Choice>
-    <mc:Fallback xmlns="">
-      <p:transition xmlns:p14="http://schemas.microsoft.com/office/powerpoint/2010/main" spd="slow"/>
-    </mc:Fallback>
-  </mc:AlternateContent>
   <p:timing>
     <p:tnLst>
       <p:par>
@@ -14956,13 +15045,31 @@
         <p:spPr/>
         <p:txBody>
           <a:bodyPr>
-            <a:normAutofit/>
+            <a:normAutofit fontScale="77500" lnSpcReduction="20000"/>
           </a:bodyPr>
           <a:lstStyle/>
           <a:p>
             <a:r>
+              <a:rPr lang="en-US" dirty="0" err="1"/>
+              <a:t>var</a:t>
+            </a:r>
+            <a:r>
+              <a:rPr lang="en-US" dirty="0"/>
+              <a:t> </a:t>
+            </a:r>
+            <a:r>
+              <a:rPr lang="en-US" dirty="0" smtClean="0"/>
+              <a:t>de= de |</a:t>
+            </a:r>
+            <a:r>
+              <a:rPr lang="en-US" dirty="0"/>
+              <a:t>| {};</a:t>
+            </a:r>
+          </a:p>
+          <a:p>
+            <a:r>
               <a:rPr lang="en-US" dirty="0" err="1" smtClean="0"/>
-              <a:t>de.immonet.action</a:t>
+              <a:t>de.immonet</a:t>
             </a:r>
             <a:r>
               <a:rPr lang="en-US" dirty="0" smtClean="0"/>
@@ -14975,105 +15082,126 @@
           </a:p>
           <a:p>
             <a:r>
+              <a:rPr lang="en-US" dirty="0" err="1" smtClean="0"/>
+              <a:t>de.immonet.person</a:t>
+            </a:r>
+            <a:r>
+              <a:rPr lang="en-US" dirty="0" smtClean="0"/>
+              <a:t> </a:t>
+            </a:r>
+            <a:r>
               <a:rPr lang="en-US" dirty="0"/>
-              <a:t>(</a:t>
-            </a:r>
+              <a:t>= {};</a:t>
+            </a:r>
+          </a:p>
+          <a:p>
+            <a:r>
+              <a:rPr lang="en-US" dirty="0"/>
+              <a:t>(function (person) {</a:t>
+            </a:r>
+          </a:p>
+          <a:p>
+            <a:r>
+              <a:rPr lang="en-US" dirty="0"/>
+              <a:t>    // Constructor</a:t>
+            </a:r>
+          </a:p>
+          <a:p>
+            <a:r>
+              <a:rPr lang="en-US" dirty="0"/>
+              <a:t>    function Person(name) {</a:t>
+            </a:r>
+          </a:p>
+          <a:p>
+            <a:r>
+              <a:rPr lang="en-US" dirty="0"/>
+              <a:t>        </a:t>
+            </a:r>
+            <a:r>
+              <a:rPr lang="en-US" dirty="0" err="1"/>
+              <a:t>this.name</a:t>
+            </a:r>
+            <a:r>
+              <a:rPr lang="en-US" dirty="0"/>
+              <a:t> = name;</a:t>
+            </a:r>
+          </a:p>
+          <a:p>
+            <a:r>
+              <a:rPr lang="en-US" dirty="0"/>
+              <a:t>    }</a:t>
+            </a:r>
+          </a:p>
+          <a:p>
             <a:r>
               <a:rPr lang="en-US" dirty="0" smtClean="0"/>
-              <a:t>function(action, person</a:t>
+              <a:t>	  /</a:t>
             </a:r>
             <a:r>
               <a:rPr lang="en-US" dirty="0"/>
-              <a:t>) {</a:t>
-            </a:r>
-          </a:p>
-          <a:p>
+              <a:t>/ Export </a:t>
+            </a:r>
+            <a:r>
+              <a:rPr lang="en-US" dirty="0" err="1" smtClean="0"/>
+              <a:t>einer</a:t>
+            </a:r>
             <a:r>
               <a:rPr lang="en-US" dirty="0" smtClean="0"/>
-              <a:t>		</a:t>
+              <a:t> Factory</a:t>
+            </a:r>
+            <a:r>
+              <a:rPr lang="en-US" dirty="0"/>
+              <a:t>-</a:t>
+            </a:r>
+            <a:r>
+              <a:rPr lang="en-US" dirty="0" err="1"/>
+              <a:t>Methode</a:t>
+            </a:r>
+            <a:endParaRPr lang="en-US" dirty="0"/>
+          </a:p>
+          <a:p>
+            <a:r>
+              <a:rPr lang="en-US" dirty="0"/>
+              <a:t>    </a:t>
             </a:r>
             <a:r>
               <a:rPr lang="en-US" dirty="0" err="1" smtClean="0"/>
-              <a:t>action.doIt</a:t>
+              <a:t>person.create</a:t>
             </a:r>
             <a:r>
               <a:rPr lang="en-US" dirty="0" smtClean="0"/>
-              <a:t> = function() </a:t>
+              <a:t> </a:t>
             </a:r>
             <a:r>
               <a:rPr lang="en-US" dirty="0"/>
-              <a:t>{</a:t>
-            </a:r>
-          </a:p>
-          <a:p>
-            <a:r>
-              <a:rPr lang="en-US" dirty="0"/>
-              <a:t> </a:t>
-            </a:r>
-            <a:r>
-              <a:rPr lang="en-US" dirty="0" smtClean="0"/>
-              <a:t>			</a:t>
-            </a:r>
-            <a:r>
-              <a:rPr lang="en-US" dirty="0" err="1" smtClean="0"/>
-              <a:t>var</a:t>
-            </a:r>
-            <a:r>
-              <a:rPr lang="en-US" dirty="0" smtClean="0"/>
-              <a:t> </a:t>
-            </a:r>
-            <a:r>
-              <a:rPr lang="en-US" dirty="0"/>
-              <a:t>me = </a:t>
-            </a:r>
-            <a:r>
-              <a:rPr lang="en-US" dirty="0" err="1"/>
-              <a:t>person.create</a:t>
-            </a:r>
-            <a:r>
-              <a:rPr lang="en-US" dirty="0"/>
-              <a:t>('Oliver');	</a:t>
-            </a:r>
-            <a:r>
-              <a:rPr lang="en-US" dirty="0" smtClean="0"/>
-              <a:t>	</a:t>
-            </a:r>
-            <a:endParaRPr lang="en-US" dirty="0"/>
-          </a:p>
-          <a:p>
-            <a:r>
-              <a:rPr lang="en-US" dirty="0" smtClean="0"/>
-              <a:t>			</a:t>
-            </a:r>
-            <a:r>
-              <a:rPr lang="en-US" dirty="0" err="1" smtClean="0"/>
-              <a:t>console.log</a:t>
+              <a:t>= function </a:t>
             </a:r>
             <a:r>
               <a:rPr lang="en-US" dirty="0" smtClean="0"/>
               <a:t>(</a:t>
             </a:r>
             <a:r>
-              <a:rPr lang="en-US" dirty="0" err="1" smtClean="0"/>
-              <a:t>me.name</a:t>
-            </a:r>
+              <a:rPr lang="en-US" dirty="0"/>
+              <a:t>name) {</a:t>
+            </a:r>
+          </a:p>
+          <a:p>
+            <a:r>
+              <a:rPr lang="en-US" dirty="0"/>
+              <a:t>        return new Person(name);</a:t>
+            </a:r>
+          </a:p>
+          <a:p>
+            <a:r>
+              <a:rPr lang="en-US" dirty="0"/>
+              <a:t>    }</a:t>
+            </a:r>
+          </a:p>
+          <a:p>
             <a:r>
               <a:rPr lang="en-US" dirty="0" smtClean="0"/>
-              <a:t>);</a:t>
-            </a:r>
-            <a:endParaRPr lang="en-US" dirty="0"/>
-          </a:p>
-          <a:p>
-            <a:r>
-              <a:rPr lang="en-US" dirty="0"/>
-              <a:t>   </a:t>
-            </a:r>
-            <a:r>
-              <a:rPr lang="en-US" dirty="0" smtClean="0"/>
-              <a:t>};</a:t>
-            </a:r>
-          </a:p>
-          <a:p>
+              <a:t>;</a:t>
+            </a:r>
             <a:endParaRPr lang="en-US" dirty="0"/>
           </a:p>
           <a:p>
@@ -15087,31 +15215,16 @@
             </a:r>
             <a:r>
               <a:rPr lang="en-US" dirty="0" err="1" smtClean="0"/>
-              <a:t>de.immonet.action</a:t>
+              <a:t>de.immonet.person</a:t>
             </a:r>
             <a:r>
               <a:rPr lang="en-US" dirty="0" smtClean="0"/>
-              <a:t>, </a:t>
-            </a:r>
-            <a:r>
-              <a:rPr lang="en-US" dirty="0" err="1" smtClean="0"/>
-              <a:t>de.immonet.person</a:t>
-            </a:r>
-            <a:r>
-              <a:rPr lang="en-US" dirty="0" smtClean="0"/>
-              <a:t>);</a:t>
-            </a:r>
-          </a:p>
-          <a:p>
-            <a:r>
-              <a:rPr lang="en-US" dirty="0" err="1" smtClean="0"/>
-              <a:t>de.immonet.action.doIt</a:t>
-            </a:r>
-            <a:r>
-              <a:rPr lang="en-US" dirty="0" smtClean="0"/>
-              <a:t>();</a:t>
-            </a:r>
-            <a:endParaRPr lang="en-US" dirty="0"/>
+              <a:t>)</a:t>
+            </a:r>
+            <a:r>
+              <a:rPr lang="en-US" dirty="0"/>
+              <a:t>;</a:t>
+            </a:r>
           </a:p>
         </p:txBody>
       </p:sp>
@@ -15136,19 +15249,7 @@
             </a:r>
             <a:r>
               <a:rPr lang="de-DE" dirty="0" smtClean="0"/>
-              <a:t> – Import und </a:t>
-            </a:r>
-            <a:r>
-              <a:rPr lang="de-DE" dirty="0" err="1" smtClean="0"/>
-              <a:t>Dependency</a:t>
-            </a:r>
-            <a:r>
-              <a:rPr lang="de-DE" dirty="0" smtClean="0"/>
-              <a:t> </a:t>
-            </a:r>
-            <a:r>
-              <a:rPr lang="de-DE" dirty="0" err="1" smtClean="0"/>
-              <a:t>Injection</a:t>
+              <a:t> – Definition mit Factory</a:t>
             </a:r>
             <a:endParaRPr lang="de-DE" dirty="0"/>
           </a:p>
@@ -15157,7 +15258,7 @@
     </p:spTree>
     <p:extLst>
       <p:ext uri="{BB962C8B-B14F-4D97-AF65-F5344CB8AC3E}">
-        <p14:creationId xmlns:p14="http://schemas.microsoft.com/office/powerpoint/2010/main" val="2026391451"/>
+        <p14:creationId xmlns:p14="http://schemas.microsoft.com/office/powerpoint/2010/main" val="966032260"/>
       </p:ext>
     </p:extLst>
   </p:cSld>
@@ -15201,6 +15302,262 @@
       </p:grpSpPr>
       <p:sp>
         <p:nvSpPr>
+          <p:cNvPr id="2" name="Inhaltsplatzhalter 1"/>
+          <p:cNvSpPr>
+            <a:spLocks noGrp="1"/>
+          </p:cNvSpPr>
+          <p:nvPr>
+            <p:ph idx="1"/>
+          </p:nvPr>
+        </p:nvSpPr>
+        <p:spPr/>
+        <p:txBody>
+          <a:bodyPr>
+            <a:normAutofit/>
+          </a:bodyPr>
+          <a:lstStyle/>
+          <a:p>
+            <a:r>
+              <a:rPr lang="en-US" dirty="0" err="1" smtClean="0"/>
+              <a:t>de.immonet.action</a:t>
+            </a:r>
+            <a:r>
+              <a:rPr lang="en-US" dirty="0" smtClean="0"/>
+              <a:t> = </a:t>
+            </a:r>
+            <a:r>
+              <a:rPr lang="en-US" dirty="0"/>
+              <a:t>{};</a:t>
+            </a:r>
+          </a:p>
+          <a:p>
+            <a:r>
+              <a:rPr lang="en-US" dirty="0"/>
+              <a:t>(</a:t>
+            </a:r>
+            <a:r>
+              <a:rPr lang="en-US" dirty="0" smtClean="0"/>
+              <a:t>function(action, person</a:t>
+            </a:r>
+            <a:r>
+              <a:rPr lang="en-US" dirty="0"/>
+              <a:t>) {</a:t>
+            </a:r>
+          </a:p>
+          <a:p>
+            <a:r>
+              <a:rPr lang="en-US" dirty="0" smtClean="0"/>
+              <a:t>		</a:t>
+            </a:r>
+            <a:r>
+              <a:rPr lang="en-US" dirty="0" err="1" smtClean="0"/>
+              <a:t>action.doIt</a:t>
+            </a:r>
+            <a:r>
+              <a:rPr lang="en-US" dirty="0" smtClean="0"/>
+              <a:t> = function() </a:t>
+            </a:r>
+            <a:r>
+              <a:rPr lang="en-US" dirty="0"/>
+              <a:t>{</a:t>
+            </a:r>
+          </a:p>
+          <a:p>
+            <a:r>
+              <a:rPr lang="en-US" dirty="0"/>
+              <a:t> </a:t>
+            </a:r>
+            <a:r>
+              <a:rPr lang="en-US" dirty="0" smtClean="0"/>
+              <a:t>			</a:t>
+            </a:r>
+            <a:r>
+              <a:rPr lang="en-US" dirty="0" err="1" smtClean="0"/>
+              <a:t>var</a:t>
+            </a:r>
+            <a:r>
+              <a:rPr lang="en-US" dirty="0" smtClean="0"/>
+              <a:t> </a:t>
+            </a:r>
+            <a:r>
+              <a:rPr lang="en-US" dirty="0"/>
+              <a:t>me = </a:t>
+            </a:r>
+            <a:r>
+              <a:rPr lang="en-US" dirty="0" err="1"/>
+              <a:t>person.create</a:t>
+            </a:r>
+            <a:r>
+              <a:rPr lang="en-US" dirty="0"/>
+              <a:t>('Oliver');	</a:t>
+            </a:r>
+            <a:r>
+              <a:rPr lang="en-US" dirty="0" smtClean="0"/>
+              <a:t>	</a:t>
+            </a:r>
+            <a:endParaRPr lang="en-US" dirty="0"/>
+          </a:p>
+          <a:p>
+            <a:r>
+              <a:rPr lang="en-US" dirty="0" smtClean="0"/>
+              <a:t>			</a:t>
+            </a:r>
+            <a:r>
+              <a:rPr lang="en-US" dirty="0" err="1" smtClean="0"/>
+              <a:t>console.log</a:t>
+            </a:r>
+            <a:r>
+              <a:rPr lang="en-US" dirty="0" smtClean="0"/>
+              <a:t>(</a:t>
+            </a:r>
+            <a:r>
+              <a:rPr lang="en-US" dirty="0" err="1" smtClean="0"/>
+              <a:t>me.name</a:t>
+            </a:r>
+            <a:r>
+              <a:rPr lang="en-US" dirty="0" smtClean="0"/>
+              <a:t>);</a:t>
+            </a:r>
+            <a:endParaRPr lang="en-US" dirty="0"/>
+          </a:p>
+          <a:p>
+            <a:r>
+              <a:rPr lang="en-US" dirty="0"/>
+              <a:t>   </a:t>
+            </a:r>
+            <a:r>
+              <a:rPr lang="en-US" dirty="0" smtClean="0"/>
+              <a:t>};</a:t>
+            </a:r>
+          </a:p>
+          <a:p>
+            <a:endParaRPr lang="en-US" dirty="0"/>
+          </a:p>
+          <a:p>
+            <a:r>
+              <a:rPr lang="en-US" dirty="0"/>
+              <a:t>})</a:t>
+            </a:r>
+            <a:r>
+              <a:rPr lang="en-US" dirty="0" smtClean="0"/>
+              <a:t>(</a:t>
+            </a:r>
+            <a:r>
+              <a:rPr lang="en-US" dirty="0" err="1" smtClean="0"/>
+              <a:t>de.immonet.action</a:t>
+            </a:r>
+            <a:r>
+              <a:rPr lang="en-US" dirty="0" smtClean="0"/>
+              <a:t>, </a:t>
+            </a:r>
+            <a:r>
+              <a:rPr lang="en-US" dirty="0" err="1" smtClean="0"/>
+              <a:t>de.immonet.person</a:t>
+            </a:r>
+            <a:r>
+              <a:rPr lang="en-US" dirty="0" smtClean="0"/>
+              <a:t>);</a:t>
+            </a:r>
+          </a:p>
+          <a:p>
+            <a:r>
+              <a:rPr lang="en-US" dirty="0" err="1" smtClean="0"/>
+              <a:t>de.immonet.action.doIt</a:t>
+            </a:r>
+            <a:r>
+              <a:rPr lang="en-US" dirty="0" smtClean="0"/>
+              <a:t>();</a:t>
+            </a:r>
+            <a:endParaRPr lang="en-US" dirty="0"/>
+          </a:p>
+        </p:txBody>
+      </p:sp>
+      <p:sp>
+        <p:nvSpPr>
+          <p:cNvPr id="3" name="Titel 2"/>
+          <p:cNvSpPr>
+            <a:spLocks noGrp="1"/>
+          </p:cNvSpPr>
+          <p:nvPr>
+            <p:ph type="title"/>
+          </p:nvPr>
+        </p:nvSpPr>
+        <p:spPr/>
+        <p:txBody>
+          <a:bodyPr/>
+          <a:lstStyle/>
+          <a:p>
+            <a:r>
+              <a:rPr lang="de-DE" dirty="0" err="1" smtClean="0"/>
+              <a:t>Namespaces</a:t>
+            </a:r>
+            <a:r>
+              <a:rPr lang="de-DE" dirty="0" smtClean="0"/>
+              <a:t> – Import und </a:t>
+            </a:r>
+            <a:r>
+              <a:rPr lang="de-DE" dirty="0" err="1" smtClean="0"/>
+              <a:t>Dependency</a:t>
+            </a:r>
+            <a:r>
+              <a:rPr lang="de-DE" dirty="0" smtClean="0"/>
+              <a:t> </a:t>
+            </a:r>
+            <a:r>
+              <a:rPr lang="de-DE" dirty="0" err="1" smtClean="0"/>
+              <a:t>Injection</a:t>
+            </a:r>
+            <a:endParaRPr lang="de-DE" dirty="0"/>
+          </a:p>
+        </p:txBody>
+      </p:sp>
+    </p:spTree>
+    <p:extLst>
+      <p:ext uri="{BB962C8B-B14F-4D97-AF65-F5344CB8AC3E}">
+        <p14:creationId xmlns:p14="http://schemas.microsoft.com/office/powerpoint/2010/main" val="2026391451"/>
+      </p:ext>
+    </p:extLst>
+  </p:cSld>
+  <p:clrMapOvr>
+    <a:masterClrMapping/>
+  </p:clrMapOvr>
+  <mc:AlternateContent xmlns:mc="http://schemas.openxmlformats.org/markup-compatibility/2006" xmlns:p14="http://schemas.microsoft.com/office/powerpoint/2010/main">
+    <mc:Choice Requires="p14">
+      <p:transition spd="slow" p14:dur="2000"/>
+    </mc:Choice>
+    <mc:Fallback xmlns="">
+      <p:transition xmlns:p14="http://schemas.microsoft.com/office/powerpoint/2010/main" spd="slow"/>
+    </mc:Fallback>
+  </mc:AlternateContent>
+  <p:timing>
+    <p:tnLst>
+      <p:par>
+        <p:cTn xmlns:p14="http://schemas.microsoft.com/office/powerpoint/2010/main" id="1" dur="indefinite" restart="never" nodeType="tmRoot"/>
+      </p:par>
+    </p:tnLst>
+  </p:timing>
+</p:sld>
+</file>
+
+<file path=ppt/slides/slide56.xml><?xml version="1.0" encoding="utf-8"?>
+<p:sld xmlns:a="http://schemas.openxmlformats.org/drawingml/2006/main" xmlns:r="http://schemas.openxmlformats.org/officeDocument/2006/relationships" xmlns:p="http://schemas.openxmlformats.org/presentationml/2006/main">
+  <p:cSld>
+    <p:spTree>
+      <p:nvGrpSpPr>
+        <p:cNvPr id="1" name=""/>
+        <p:cNvGrpSpPr/>
+        <p:nvPr/>
+      </p:nvGrpSpPr>
+      <p:grpSpPr>
+        <a:xfrm>
+          <a:off x="0" y="0"/>
+          <a:ext cx="0" cy="0"/>
+          <a:chOff x="0" y="0"/>
+          <a:chExt cx="0" cy="0"/>
+        </a:xfrm>
+      </p:grpSpPr>
+      <p:sp>
+        <p:nvSpPr>
           <p:cNvPr id="5" name="Rechteck 4"/>
           <p:cNvSpPr/>
           <p:nvPr/>
@@ -15469,31 +15826,7 @@
                   <a:srgbClr val="FFFFFF"/>
                 </a:solidFill>
               </a:rPr>
-              <a:t>Übung </a:t>
-            </a:r>
-            <a:r>
-              <a:rPr lang="de-DE" dirty="0" smtClean="0">
-                <a:solidFill>
-                  <a:srgbClr val="FFFFFF"/>
-                </a:solidFill>
-              </a:rPr>
-              <a:t>#10 </a:t>
-            </a:r>
-            <a:r>
-              <a:rPr lang="de-DE" dirty="0" smtClean="0">
-                <a:solidFill>
-                  <a:srgbClr val="FFFFFF"/>
-                </a:solidFill>
-              </a:rPr>
-              <a:t>-  </a:t>
-            </a:r>
-            <a:r>
-              <a:rPr lang="de-DE" dirty="0" smtClean="0">
-                <a:solidFill>
-                  <a:srgbClr val="FFFFFF"/>
-                </a:solidFill>
-              </a:rPr>
-              <a:t>klassische Module</a:t>
+              <a:t>Übung #10 -  klassische Module</a:t>
             </a:r>
             <a:endParaRPr lang="de-DE" dirty="0">
               <a:solidFill>
@@ -15523,7 +15856,7 @@
 </p:sld>
 </file>
 
-<file path=ppt/slides/slide56.xml><?xml version="1.0" encoding="utf-8"?>
+<file path=ppt/slides/slide57.xml><?xml version="1.0" encoding="utf-8"?>
 <p:sld xmlns:a="http://schemas.openxmlformats.org/drawingml/2006/main" xmlns:r="http://schemas.openxmlformats.org/officeDocument/2006/relationships" xmlns:p="http://schemas.openxmlformats.org/presentationml/2006/main">
   <p:cSld>
     <p:spTree>
@@ -15590,7 +15923,7 @@
 </p:sld>
 </file>
 
-<file path=ppt/slides/slide57.xml><?xml version="1.0" encoding="utf-8"?>
+<file path=ppt/slides/slide58.xml><?xml version="1.0" encoding="utf-8"?>
 <p:sld xmlns:a="http://schemas.openxmlformats.org/drawingml/2006/main" xmlns:r="http://schemas.openxmlformats.org/officeDocument/2006/relationships" xmlns:p="http://schemas.openxmlformats.org/presentationml/2006/main">
   <p:cSld>
     <p:spTree>
@@ -15680,354 +16013,6 @@
 </p:sld>
 </file>
 
-<file path=ppt/slides/slide58.xml><?xml version="1.0" encoding="utf-8"?>
-<p:sld xmlns:a="http://schemas.openxmlformats.org/drawingml/2006/main" xmlns:r="http://schemas.openxmlformats.org/officeDocument/2006/relationships" xmlns:p="http://schemas.openxmlformats.org/presentationml/2006/main">
-  <p:cSld>
-    <p:spTree>
-      <p:nvGrpSpPr>
-        <p:cNvPr id="1" name=""/>
-        <p:cNvGrpSpPr/>
-        <p:nvPr/>
-      </p:nvGrpSpPr>
-      <p:grpSpPr>
-        <a:xfrm>
-          <a:off x="0" y="0"/>
-          <a:ext cx="0" cy="0"/>
-          <a:chOff x="0" y="0"/>
-          <a:chExt cx="0" cy="0"/>
-        </a:xfrm>
-      </p:grpSpPr>
-      <p:sp>
-        <p:nvSpPr>
-          <p:cNvPr id="2" name="Inhaltsplatzhalter 1"/>
-          <p:cNvSpPr>
-            <a:spLocks noGrp="1"/>
-          </p:cNvSpPr>
-          <p:nvPr>
-            <p:ph idx="1"/>
-          </p:nvPr>
-        </p:nvSpPr>
-        <p:spPr>
-          <a:xfrm>
-            <a:off x="252000" y="1188000"/>
-            <a:ext cx="8532000" cy="5481360"/>
-          </a:xfrm>
-        </p:spPr>
-        <p:txBody>
-          <a:bodyPr>
-            <a:normAutofit lnSpcReduction="10000"/>
-          </a:bodyPr>
-          <a:lstStyle/>
-          <a:p>
-            <a:r>
-              <a:rPr lang="de-DE" dirty="0"/>
-              <a:t>// </a:t>
-            </a:r>
-            <a:r>
-              <a:rPr lang="de-DE" sz="1300" dirty="0" smtClean="0"/>
-              <a:t>@</a:t>
-            </a:r>
-            <a:r>
-              <a:rPr lang="de-DE" sz="1300" dirty="0" err="1" smtClean="0"/>
-              <a:t>see</a:t>
-            </a:r>
-            <a:r>
-              <a:rPr lang="de-DE" sz="1300" dirty="0" smtClean="0"/>
-              <a:t> http</a:t>
-            </a:r>
-            <a:r>
-              <a:rPr lang="de-DE" sz="1300" dirty="0"/>
-              <a:t>://</a:t>
-            </a:r>
-            <a:r>
-              <a:rPr lang="de-DE" sz="1300" dirty="0" err="1"/>
-              <a:t>freshbrewedcode.com</a:t>
-            </a:r>
-            <a:r>
-              <a:rPr lang="de-DE" sz="1300" dirty="0"/>
-              <a:t>/</a:t>
-            </a:r>
-            <a:r>
-              <a:rPr lang="de-DE" sz="1300" dirty="0" err="1"/>
-              <a:t>derekgreer</a:t>
-            </a:r>
-            <a:r>
-              <a:rPr lang="de-DE" sz="1300" dirty="0"/>
-              <a:t>/2011/11/28/</a:t>
-            </a:r>
-            <a:r>
-              <a:rPr lang="de-DE" sz="1300" dirty="0" err="1"/>
-              <a:t>getting</a:t>
-            </a:r>
-            <a:r>
-              <a:rPr lang="de-DE" sz="1300" dirty="0"/>
-              <a:t>-</a:t>
-            </a:r>
-            <a:r>
-              <a:rPr lang="de-DE" sz="1300" dirty="0" err="1"/>
-              <a:t>started</a:t>
-            </a:r>
-            <a:r>
-              <a:rPr lang="de-DE" sz="1300" dirty="0"/>
-              <a:t>-with-</a:t>
-            </a:r>
-            <a:r>
-              <a:rPr lang="de-DE" sz="1300" dirty="0" err="1"/>
-              <a:t>requirejs</a:t>
-            </a:r>
-            <a:r>
-              <a:rPr lang="de-DE" sz="1300" dirty="0" smtClean="0"/>
-              <a:t>/</a:t>
-            </a:r>
-          </a:p>
-          <a:p>
-            <a:r>
-              <a:rPr lang="de-DE" dirty="0" smtClean="0"/>
-              <a:t>/</a:t>
-            </a:r>
-            <a:r>
-              <a:rPr lang="de-DE" dirty="0"/>
-              <a:t>/ </a:t>
-            </a:r>
-            <a:r>
-              <a:rPr lang="de-DE" dirty="0" err="1"/>
-              <a:t>customerModule</a:t>
-            </a:r>
-            <a:endParaRPr lang="de-DE" dirty="0"/>
-          </a:p>
-          <a:p>
-            <a:r>
-              <a:rPr lang="de-DE" dirty="0" err="1"/>
-              <a:t>define</a:t>
-            </a:r>
-            <a:r>
-              <a:rPr lang="de-DE" dirty="0"/>
-              <a:t>(</a:t>
-            </a:r>
-            <a:r>
-              <a:rPr lang="de-DE" dirty="0" err="1"/>
-              <a:t>function</a:t>
-            </a:r>
-            <a:r>
-              <a:rPr lang="de-DE" dirty="0"/>
-              <a:t>() {</a:t>
-            </a:r>
-          </a:p>
-          <a:p>
-            <a:r>
-              <a:rPr lang="de-DE" dirty="0"/>
-              <a:t>    return {</a:t>
-            </a:r>
-          </a:p>
-          <a:p>
-            <a:r>
-              <a:rPr lang="de-DE" dirty="0"/>
-              <a:t>         </a:t>
-            </a:r>
-            <a:r>
-              <a:rPr lang="de-DE" dirty="0" err="1"/>
-              <a:t>getCustomers</a:t>
-            </a:r>
-            <a:r>
-              <a:rPr lang="de-DE" dirty="0"/>
-              <a:t>: </a:t>
-            </a:r>
-            <a:r>
-              <a:rPr lang="de-DE" dirty="0" err="1"/>
-              <a:t>function</a:t>
-            </a:r>
-            <a:r>
-              <a:rPr lang="de-DE" dirty="0"/>
-              <a:t>() </a:t>
-            </a:r>
-            <a:r>
-              <a:rPr lang="de-DE" dirty="0" smtClean="0"/>
-              <a:t>{ /* do </a:t>
-            </a:r>
-            <a:r>
-              <a:rPr lang="de-DE" dirty="0" err="1" smtClean="0"/>
-              <a:t>something</a:t>
-            </a:r>
-            <a:r>
-              <a:rPr lang="de-DE" dirty="0" smtClean="0"/>
-              <a:t> */ }</a:t>
-            </a:r>
-            <a:endParaRPr lang="de-DE" dirty="0"/>
-          </a:p>
-          <a:p>
-            <a:r>
-              <a:rPr lang="de-DE" dirty="0"/>
-              <a:t>    }</a:t>
-            </a:r>
-          </a:p>
-          <a:p>
-            <a:r>
-              <a:rPr lang="de-DE" dirty="0"/>
-              <a:t>});</a:t>
-            </a:r>
-          </a:p>
-          <a:p>
-            <a:endParaRPr lang="de-DE" dirty="0"/>
-          </a:p>
-          <a:p>
-            <a:r>
-              <a:rPr lang="de-DE" dirty="0"/>
-              <a:t>// </a:t>
-            </a:r>
-            <a:r>
-              <a:rPr lang="de-DE" dirty="0" err="1"/>
-              <a:t>oderModule</a:t>
-            </a:r>
-            <a:endParaRPr lang="de-DE" dirty="0"/>
-          </a:p>
-          <a:p>
-            <a:r>
-              <a:rPr lang="de-DE" dirty="0" err="1"/>
-              <a:t>define</a:t>
-            </a:r>
-            <a:r>
-              <a:rPr lang="de-DE" dirty="0"/>
-              <a:t>(</a:t>
-            </a:r>
-            <a:r>
-              <a:rPr lang="de-DE" dirty="0" err="1"/>
-              <a:t>function</a:t>
-            </a:r>
-            <a:r>
-              <a:rPr lang="de-DE" dirty="0"/>
-              <a:t>() {</a:t>
-            </a:r>
-          </a:p>
-          <a:p>
-            <a:r>
-              <a:rPr lang="de-DE" dirty="0"/>
-              <a:t>    return {</a:t>
-            </a:r>
-          </a:p>
-          <a:p>
-            <a:r>
-              <a:rPr lang="de-DE" dirty="0"/>
-              <a:t>         </a:t>
-            </a:r>
-            <a:r>
-              <a:rPr lang="de-DE" dirty="0" err="1"/>
-              <a:t>getOrders</a:t>
-            </a:r>
-            <a:r>
-              <a:rPr lang="de-DE" dirty="0"/>
-              <a:t>: </a:t>
-            </a:r>
-            <a:r>
-              <a:rPr lang="de-DE" dirty="0" err="1"/>
-              <a:t>function</a:t>
-            </a:r>
-            <a:r>
-              <a:rPr lang="de-DE" dirty="0"/>
-              <a:t>() </a:t>
-            </a:r>
-            <a:r>
-              <a:rPr lang="de-DE" dirty="0" smtClean="0"/>
-              <a:t>{ /</a:t>
-            </a:r>
-            <a:r>
-              <a:rPr lang="de-DE" dirty="0"/>
-              <a:t>* do </a:t>
-            </a:r>
-            <a:r>
-              <a:rPr lang="de-DE" dirty="0" err="1"/>
-              <a:t>something</a:t>
-            </a:r>
-            <a:r>
-              <a:rPr lang="de-DE" dirty="0"/>
-              <a:t> */ </a:t>
-            </a:r>
-            <a:r>
-              <a:rPr lang="de-DE" dirty="0" smtClean="0"/>
-              <a:t>}</a:t>
-            </a:r>
-            <a:endParaRPr lang="de-DE" dirty="0"/>
-          </a:p>
-          <a:p>
-            <a:r>
-              <a:rPr lang="de-DE" dirty="0"/>
-              <a:t>    }</a:t>
-            </a:r>
-          </a:p>
-          <a:p>
-            <a:r>
-              <a:rPr lang="de-DE" dirty="0"/>
-              <a:t>});</a:t>
-            </a:r>
-          </a:p>
-          <a:p>
-            <a:endParaRPr lang="de-DE" dirty="0"/>
-          </a:p>
-        </p:txBody>
-      </p:sp>
-      <p:sp>
-        <p:nvSpPr>
-          <p:cNvPr id="3" name="Titel 2"/>
-          <p:cNvSpPr>
-            <a:spLocks noGrp="1"/>
-          </p:cNvSpPr>
-          <p:nvPr>
-            <p:ph type="title"/>
-          </p:nvPr>
-        </p:nvSpPr>
-        <p:spPr/>
-        <p:txBody>
-          <a:bodyPr>
-            <a:normAutofit/>
-          </a:bodyPr>
-          <a:lstStyle/>
-          <a:p>
-            <a:r>
-              <a:rPr lang="de-DE" dirty="0" err="1"/>
-              <a:t>Define</a:t>
-            </a:r>
-            <a:r>
-              <a:rPr lang="de-DE" dirty="0"/>
-              <a:t> </a:t>
-            </a:r>
-            <a:r>
-              <a:rPr lang="de-DE" dirty="0" smtClean="0"/>
-              <a:t>durch </a:t>
-            </a:r>
-            <a:r>
-              <a:rPr lang="de-DE" dirty="0"/>
-              <a:t>AMD (</a:t>
-            </a:r>
-            <a:r>
-              <a:rPr lang="de-DE" dirty="0" err="1"/>
-              <a:t>require.js</a:t>
-            </a:r>
-            <a:r>
-              <a:rPr lang="de-DE" dirty="0"/>
-              <a:t>)</a:t>
-            </a:r>
-          </a:p>
-        </p:txBody>
-      </p:sp>
-    </p:spTree>
-    <p:extLst>
-      <p:ext uri="{BB962C8B-B14F-4D97-AF65-F5344CB8AC3E}">
-        <p14:creationId xmlns:p14="http://schemas.microsoft.com/office/powerpoint/2010/main" val="172567752"/>
-      </p:ext>
-    </p:extLst>
-  </p:cSld>
-  <p:clrMapOvr>
-    <a:masterClrMapping/>
-  </p:clrMapOvr>
-  <p:timing>
-    <p:tnLst>
-      <p:par>
-        <p:cTn xmlns:p14="http://schemas.microsoft.com/office/powerpoint/2010/main" id="1" dur="indefinite" restart="never" nodeType="tmRoot"/>
-      </p:par>
-    </p:tnLst>
-  </p:timing>
-</p:sld>
-</file>
-
 <file path=ppt/slides/slide59.xml><?xml version="1.0" encoding="utf-8"?>
 <p:sld xmlns:a="http://schemas.openxmlformats.org/drawingml/2006/main" xmlns:r="http://schemas.openxmlformats.org/officeDocument/2006/relationships" xmlns:p="http://schemas.openxmlformats.org/presentationml/2006/main">
   <p:cSld>
@@ -16055,6 +16040,273 @@
             <p:ph idx="1"/>
           </p:nvPr>
         </p:nvSpPr>
+        <p:spPr>
+          <a:xfrm>
+            <a:off x="252000" y="1188000"/>
+            <a:ext cx="8532000" cy="5481360"/>
+          </a:xfrm>
+        </p:spPr>
+        <p:txBody>
+          <a:bodyPr>
+            <a:normAutofit lnSpcReduction="10000"/>
+          </a:bodyPr>
+          <a:lstStyle/>
+          <a:p>
+            <a:r>
+              <a:rPr lang="de-DE" dirty="0"/>
+              <a:t>// </a:t>
+            </a:r>
+            <a:r>
+              <a:rPr lang="de-DE" sz="1300" dirty="0" smtClean="0"/>
+              <a:t>@</a:t>
+            </a:r>
+            <a:r>
+              <a:rPr lang="de-DE" sz="1300" dirty="0" err="1" smtClean="0"/>
+              <a:t>see</a:t>
+            </a:r>
+            <a:r>
+              <a:rPr lang="de-DE" sz="1300" dirty="0" smtClean="0"/>
+              <a:t> http</a:t>
+            </a:r>
+            <a:r>
+              <a:rPr lang="de-DE" sz="1300" dirty="0"/>
+              <a:t>://</a:t>
+            </a:r>
+            <a:r>
+              <a:rPr lang="de-DE" sz="1300" dirty="0" err="1"/>
+              <a:t>freshbrewedcode.com</a:t>
+            </a:r>
+            <a:r>
+              <a:rPr lang="de-DE" sz="1300" dirty="0"/>
+              <a:t>/</a:t>
+            </a:r>
+            <a:r>
+              <a:rPr lang="de-DE" sz="1300" dirty="0" err="1"/>
+              <a:t>derekgreer</a:t>
+            </a:r>
+            <a:r>
+              <a:rPr lang="de-DE" sz="1300" dirty="0"/>
+              <a:t>/2011/11/28/</a:t>
+            </a:r>
+            <a:r>
+              <a:rPr lang="de-DE" sz="1300" dirty="0" err="1"/>
+              <a:t>getting</a:t>
+            </a:r>
+            <a:r>
+              <a:rPr lang="de-DE" sz="1300" dirty="0"/>
+              <a:t>-</a:t>
+            </a:r>
+            <a:r>
+              <a:rPr lang="de-DE" sz="1300" dirty="0" err="1"/>
+              <a:t>started</a:t>
+            </a:r>
+            <a:r>
+              <a:rPr lang="de-DE" sz="1300" dirty="0"/>
+              <a:t>-with-</a:t>
+            </a:r>
+            <a:r>
+              <a:rPr lang="de-DE" sz="1300" dirty="0" err="1"/>
+              <a:t>requirejs</a:t>
+            </a:r>
+            <a:r>
+              <a:rPr lang="de-DE" sz="1300" dirty="0" smtClean="0"/>
+              <a:t>/</a:t>
+            </a:r>
+          </a:p>
+          <a:p>
+            <a:r>
+              <a:rPr lang="de-DE" dirty="0" smtClean="0"/>
+              <a:t>/</a:t>
+            </a:r>
+            <a:r>
+              <a:rPr lang="de-DE" dirty="0"/>
+              <a:t>/ </a:t>
+            </a:r>
+            <a:r>
+              <a:rPr lang="de-DE" dirty="0" err="1"/>
+              <a:t>customerModule</a:t>
+            </a:r>
+            <a:endParaRPr lang="de-DE" dirty="0"/>
+          </a:p>
+          <a:p>
+            <a:r>
+              <a:rPr lang="de-DE" dirty="0" err="1"/>
+              <a:t>define</a:t>
+            </a:r>
+            <a:r>
+              <a:rPr lang="de-DE" dirty="0"/>
+              <a:t>(</a:t>
+            </a:r>
+            <a:r>
+              <a:rPr lang="de-DE" dirty="0" err="1"/>
+              <a:t>function</a:t>
+            </a:r>
+            <a:r>
+              <a:rPr lang="de-DE" dirty="0"/>
+              <a:t>() {</a:t>
+            </a:r>
+          </a:p>
+          <a:p>
+            <a:r>
+              <a:rPr lang="de-DE" dirty="0"/>
+              <a:t>    return {</a:t>
+            </a:r>
+          </a:p>
+          <a:p>
+            <a:r>
+              <a:rPr lang="de-DE" dirty="0"/>
+              <a:t>         </a:t>
+            </a:r>
+            <a:r>
+              <a:rPr lang="de-DE" dirty="0" err="1"/>
+              <a:t>getCustomers</a:t>
+            </a:r>
+            <a:r>
+              <a:rPr lang="de-DE" dirty="0"/>
+              <a:t>: </a:t>
+            </a:r>
+            <a:r>
+              <a:rPr lang="de-DE" dirty="0" err="1"/>
+              <a:t>function</a:t>
+            </a:r>
+            <a:r>
+              <a:rPr lang="de-DE" dirty="0"/>
+              <a:t>() </a:t>
+            </a:r>
+            <a:r>
+              <a:rPr lang="de-DE" dirty="0" smtClean="0"/>
+              <a:t>{ /* do </a:t>
+            </a:r>
+            <a:r>
+              <a:rPr lang="de-DE" dirty="0" err="1" smtClean="0"/>
+              <a:t>something</a:t>
+            </a:r>
+            <a:r>
+              <a:rPr lang="de-DE" dirty="0" smtClean="0"/>
+              <a:t> */ }</a:t>
+            </a:r>
+            <a:endParaRPr lang="de-DE" dirty="0"/>
+          </a:p>
+          <a:p>
+            <a:r>
+              <a:rPr lang="de-DE" dirty="0"/>
+              <a:t>    }</a:t>
+            </a:r>
+          </a:p>
+          <a:p>
+            <a:r>
+              <a:rPr lang="de-DE" dirty="0"/>
+              <a:t>});</a:t>
+            </a:r>
+          </a:p>
+          <a:p>
+            <a:endParaRPr lang="de-DE" dirty="0"/>
+          </a:p>
+          <a:p>
+            <a:r>
+              <a:rPr lang="de-DE" dirty="0"/>
+              <a:t>// </a:t>
+            </a:r>
+            <a:r>
+              <a:rPr lang="de-DE" dirty="0" err="1"/>
+              <a:t>oderModule</a:t>
+            </a:r>
+            <a:endParaRPr lang="de-DE" dirty="0"/>
+          </a:p>
+          <a:p>
+            <a:r>
+              <a:rPr lang="de-DE" dirty="0" err="1"/>
+              <a:t>define</a:t>
+            </a:r>
+            <a:r>
+              <a:rPr lang="de-DE" dirty="0"/>
+              <a:t>(</a:t>
+            </a:r>
+            <a:r>
+              <a:rPr lang="de-DE" dirty="0" err="1"/>
+              <a:t>function</a:t>
+            </a:r>
+            <a:r>
+              <a:rPr lang="de-DE" dirty="0"/>
+              <a:t>() {</a:t>
+            </a:r>
+          </a:p>
+          <a:p>
+            <a:r>
+              <a:rPr lang="de-DE" dirty="0"/>
+              <a:t>    return {</a:t>
+            </a:r>
+          </a:p>
+          <a:p>
+            <a:r>
+              <a:rPr lang="de-DE" dirty="0"/>
+              <a:t>         </a:t>
+            </a:r>
+            <a:r>
+              <a:rPr lang="de-DE" dirty="0" err="1"/>
+              <a:t>getOrders</a:t>
+            </a:r>
+            <a:r>
+              <a:rPr lang="de-DE" dirty="0"/>
+              <a:t>: </a:t>
+            </a:r>
+            <a:r>
+              <a:rPr lang="de-DE" dirty="0" err="1"/>
+              <a:t>function</a:t>
+            </a:r>
+            <a:r>
+              <a:rPr lang="de-DE" dirty="0"/>
+              <a:t>() </a:t>
+            </a:r>
+            <a:r>
+              <a:rPr lang="de-DE" dirty="0" smtClean="0"/>
+              <a:t>{ /</a:t>
+            </a:r>
+            <a:r>
+              <a:rPr lang="de-DE" dirty="0"/>
+              <a:t>* do </a:t>
+            </a:r>
+            <a:r>
+              <a:rPr lang="de-DE" dirty="0" err="1"/>
+              <a:t>something</a:t>
+            </a:r>
+            <a:r>
+              <a:rPr lang="de-DE" dirty="0"/>
+              <a:t> */ </a:t>
+            </a:r>
+            <a:r>
+              <a:rPr lang="de-DE" dirty="0" smtClean="0"/>
+              <a:t>}</a:t>
+            </a:r>
+            <a:endParaRPr lang="de-DE" dirty="0"/>
+          </a:p>
+          <a:p>
+            <a:r>
+              <a:rPr lang="de-DE" dirty="0"/>
+              <a:t>    }</a:t>
+            </a:r>
+          </a:p>
+          <a:p>
+            <a:r>
+              <a:rPr lang="de-DE" dirty="0"/>
+              <a:t>});</a:t>
+            </a:r>
+          </a:p>
+          <a:p>
+            <a:endParaRPr lang="de-DE" dirty="0"/>
+          </a:p>
+        </p:txBody>
+      </p:sp>
+      <p:sp>
+        <p:nvSpPr>
+          <p:cNvPr id="3" name="Titel 2"/>
+          <p:cNvSpPr>
+            <a:spLocks noGrp="1"/>
+          </p:cNvSpPr>
+          <p:nvPr>
+            <p:ph type="title"/>
+          </p:nvPr>
+        </p:nvSpPr>
         <p:spPr/>
         <p:txBody>
           <a:bodyPr>
@@ -16063,238 +16315,20 @@
           <a:lstStyle/>
           <a:p>
             <a:r>
-              <a:rPr lang="de-DE" dirty="0" smtClean="0"/>
-              <a:t>// </a:t>
-            </a:r>
-            <a:r>
-              <a:rPr lang="de-DE" sz="1200" dirty="0"/>
-              <a:t>@</a:t>
-            </a:r>
-            <a:r>
-              <a:rPr lang="de-DE" sz="1200" dirty="0" err="1"/>
-              <a:t>see</a:t>
-            </a:r>
-            <a:r>
-              <a:rPr lang="de-DE" sz="1200" dirty="0"/>
-              <a:t> http://</a:t>
-            </a:r>
-            <a:r>
-              <a:rPr lang="de-DE" sz="1200" dirty="0" err="1"/>
-              <a:t>freshbrewedcode.com</a:t>
-            </a:r>
-            <a:r>
-              <a:rPr lang="de-DE" sz="1200" dirty="0"/>
-              <a:t>/</a:t>
-            </a:r>
-            <a:r>
-              <a:rPr lang="de-DE" sz="1200" dirty="0" err="1"/>
-              <a:t>derekgreer</a:t>
-            </a:r>
-            <a:r>
-              <a:rPr lang="de-DE" sz="1200" dirty="0"/>
-              <a:t>/2011/11/28/</a:t>
-            </a:r>
-            <a:r>
-              <a:rPr lang="de-DE" sz="1200" dirty="0" err="1"/>
-              <a:t>getting</a:t>
-            </a:r>
-            <a:r>
-              <a:rPr lang="de-DE" sz="1200" dirty="0"/>
-              <a:t>-</a:t>
-            </a:r>
-            <a:r>
-              <a:rPr lang="de-DE" sz="1200" dirty="0" err="1"/>
-              <a:t>started</a:t>
-            </a:r>
-            <a:r>
-              <a:rPr lang="de-DE" sz="1200" dirty="0"/>
-              <a:t>-with-</a:t>
-            </a:r>
-            <a:r>
-              <a:rPr lang="de-DE" sz="1200" dirty="0" err="1"/>
-              <a:t>requirejs</a:t>
-            </a:r>
-            <a:r>
-              <a:rPr lang="de-DE" sz="1200" dirty="0"/>
-              <a:t>/</a:t>
-            </a:r>
-          </a:p>
-          <a:p>
-            <a:r>
-              <a:rPr lang="de-DE" dirty="0" err="1" smtClean="0"/>
-              <a:t>require</a:t>
-            </a:r>
-            <a:r>
-              <a:rPr lang="de-DE" dirty="0"/>
-              <a:t>(["</a:t>
-            </a:r>
-            <a:r>
-              <a:rPr lang="de-DE" dirty="0" err="1"/>
-              <a:t>customerModule</a:t>
-            </a:r>
-            <a:r>
-              <a:rPr lang="de-DE" dirty="0"/>
-              <a:t>", "</a:t>
-            </a:r>
-            <a:r>
-              <a:rPr lang="de-DE" dirty="0" err="1"/>
-              <a:t>orderModule</a:t>
-            </a:r>
-            <a:r>
-              <a:rPr lang="de-DE" dirty="0"/>
-              <a:t>"</a:t>
-            </a:r>
-            <a:r>
-              <a:rPr lang="de-DE" dirty="0" smtClean="0"/>
-              <a:t>], </a:t>
-            </a:r>
-            <a:r>
-              <a:rPr lang="de-DE" dirty="0" err="1"/>
-              <a:t>function</a:t>
-            </a:r>
-            <a:r>
-              <a:rPr lang="de-DE" dirty="0"/>
-              <a:t>(c, o) </a:t>
-            </a:r>
-            <a:r>
-              <a:rPr lang="de-DE" dirty="0" smtClean="0"/>
-              <a:t>{</a:t>
-            </a:r>
-            <a:endParaRPr lang="de-DE" dirty="0"/>
-          </a:p>
-          <a:p>
-            <a:r>
-              <a:rPr lang="de-DE" dirty="0"/>
-              <a:t>    var </a:t>
-            </a:r>
-            <a:r>
-              <a:rPr lang="de-DE" dirty="0" err="1"/>
-              <a:t>customers</a:t>
-            </a:r>
-            <a:r>
-              <a:rPr lang="de-DE" dirty="0"/>
-              <a:t> = </a:t>
-            </a:r>
-            <a:r>
-              <a:rPr lang="de-DE" dirty="0" err="1"/>
-              <a:t>c.getCustomers</a:t>
-            </a:r>
-            <a:r>
-              <a:rPr lang="de-DE" dirty="0"/>
-              <a:t>();</a:t>
-            </a:r>
-          </a:p>
-          <a:p>
-            <a:r>
-              <a:rPr lang="de-DE" dirty="0"/>
-              <a:t>    // do </a:t>
-            </a:r>
-            <a:r>
-              <a:rPr lang="de-DE" dirty="0" err="1"/>
-              <a:t>something</a:t>
-            </a:r>
-            <a:r>
-              <a:rPr lang="de-DE" dirty="0"/>
-              <a:t> with </a:t>
-            </a:r>
-            <a:r>
-              <a:rPr lang="de-DE" dirty="0" err="1"/>
-              <a:t>customers</a:t>
-            </a:r>
-            <a:r>
-              <a:rPr lang="de-DE" dirty="0"/>
-              <a:t> ...</a:t>
-            </a:r>
-          </a:p>
-          <a:p>
-            <a:endParaRPr lang="de-DE" dirty="0"/>
-          </a:p>
-          <a:p>
-            <a:r>
-              <a:rPr lang="de-DE" dirty="0"/>
-              <a:t>    var </a:t>
-            </a:r>
-            <a:r>
-              <a:rPr lang="de-DE" dirty="0" err="1"/>
-              <a:t>orders</a:t>
-            </a:r>
-            <a:r>
-              <a:rPr lang="de-DE" dirty="0"/>
-              <a:t> = </a:t>
-            </a:r>
-            <a:r>
-              <a:rPr lang="de-DE" dirty="0" err="1"/>
-              <a:t>o.getOrders</a:t>
-            </a:r>
-            <a:r>
-              <a:rPr lang="de-DE" dirty="0"/>
-              <a:t>();</a:t>
-            </a:r>
-          </a:p>
-          <a:p>
-            <a:r>
-              <a:rPr lang="de-DE" dirty="0"/>
-              <a:t>    // do </a:t>
-            </a:r>
-            <a:r>
-              <a:rPr lang="de-DE" dirty="0" err="1"/>
-              <a:t>something</a:t>
-            </a:r>
-            <a:r>
-              <a:rPr lang="de-DE" dirty="0"/>
-              <a:t> with </a:t>
-            </a:r>
-            <a:r>
-              <a:rPr lang="de-DE" dirty="0" err="1"/>
-              <a:t>orders</a:t>
-            </a:r>
-            <a:r>
-              <a:rPr lang="de-DE" dirty="0"/>
-              <a:t> ...    </a:t>
-            </a:r>
-          </a:p>
-          <a:p>
-            <a:r>
-              <a:rPr lang="de-DE" dirty="0"/>
-              <a:t>});</a:t>
-            </a:r>
-          </a:p>
-          <a:p>
-            <a:endParaRPr lang="de-DE" dirty="0"/>
-          </a:p>
-          <a:p>
-            <a:endParaRPr lang="de-DE" dirty="0"/>
-          </a:p>
-        </p:txBody>
-      </p:sp>
-      <p:sp>
-        <p:nvSpPr>
-          <p:cNvPr id="3" name="Titel 2"/>
-          <p:cNvSpPr>
-            <a:spLocks noGrp="1"/>
-          </p:cNvSpPr>
-          <p:nvPr>
-            <p:ph type="title"/>
-          </p:nvPr>
-        </p:nvSpPr>
-        <p:spPr/>
-        <p:txBody>
-          <a:bodyPr>
-            <a:normAutofit/>
-          </a:bodyPr>
-          <a:lstStyle/>
-          <a:p>
-            <a:r>
-              <a:rPr lang="de-DE" dirty="0" err="1" smtClean="0"/>
-              <a:t>Require</a:t>
-            </a:r>
-            <a:r>
-              <a:rPr lang="de-DE" dirty="0" smtClean="0"/>
-              <a:t> </a:t>
-            </a:r>
-            <a:r>
-              <a:rPr lang="de-DE" dirty="0"/>
-              <a:t>durch AMD (</a:t>
+              <a:rPr lang="de-DE" dirty="0" err="1"/>
+              <a:t>Define</a:t>
+            </a:r>
+            <a:r>
+              <a:rPr lang="de-DE" dirty="0"/>
+              <a:t> </a:t>
+            </a:r>
+            <a:r>
+              <a:rPr lang="de-DE" dirty="0" smtClean="0"/>
+              <a:t>durch </a:t>
+            </a:r>
+            <a:r>
+              <a:rPr lang="de-DE" dirty="0"/>
+              <a:t>AMD (</a:t>
             </a:r>
             <a:r>
               <a:rPr lang="de-DE" dirty="0" err="1"/>
@@ -16310,7 +16344,7 @@
     </p:spTree>
     <p:extLst>
       <p:ext uri="{BB962C8B-B14F-4D97-AF65-F5344CB8AC3E}">
-        <p14:creationId xmlns:p14="http://schemas.microsoft.com/office/powerpoint/2010/main" val="3614526317"/>
+        <p14:creationId xmlns:p14="http://schemas.microsoft.com/office/powerpoint/2010/main" val="172567752"/>
       </p:ext>
     </p:extLst>
   </p:cSld>
@@ -16597,6 +16631,305 @@
 </file>
 
 <file path=ppt/slides/slide60.xml><?xml version="1.0" encoding="utf-8"?>
+<p:sld xmlns:a="http://schemas.openxmlformats.org/drawingml/2006/main" xmlns:r="http://schemas.openxmlformats.org/officeDocument/2006/relationships" xmlns:p="http://schemas.openxmlformats.org/presentationml/2006/main">
+  <p:cSld>
+    <p:spTree>
+      <p:nvGrpSpPr>
+        <p:cNvPr id="1" name=""/>
+        <p:cNvGrpSpPr/>
+        <p:nvPr/>
+      </p:nvGrpSpPr>
+      <p:grpSpPr>
+        <a:xfrm>
+          <a:off x="0" y="0"/>
+          <a:ext cx="0" cy="0"/>
+          <a:chOff x="0" y="0"/>
+          <a:chExt cx="0" cy="0"/>
+        </a:xfrm>
+      </p:grpSpPr>
+      <p:sp>
+        <p:nvSpPr>
+          <p:cNvPr id="2" name="Inhaltsplatzhalter 1"/>
+          <p:cNvSpPr>
+            <a:spLocks noGrp="1"/>
+          </p:cNvSpPr>
+          <p:nvPr>
+            <p:ph idx="1"/>
+          </p:nvPr>
+        </p:nvSpPr>
+        <p:spPr/>
+        <p:txBody>
+          <a:bodyPr>
+            <a:normAutofit/>
+          </a:bodyPr>
+          <a:lstStyle/>
+          <a:p>
+            <a:r>
+              <a:rPr lang="de-DE" dirty="0" smtClean="0"/>
+              <a:t>// </a:t>
+            </a:r>
+            <a:r>
+              <a:rPr lang="de-DE" sz="1200" dirty="0"/>
+              <a:t>@</a:t>
+            </a:r>
+            <a:r>
+              <a:rPr lang="de-DE" sz="1200" dirty="0" err="1"/>
+              <a:t>see</a:t>
+            </a:r>
+            <a:r>
+              <a:rPr lang="de-DE" sz="1200" dirty="0"/>
+              <a:t> http://</a:t>
+            </a:r>
+            <a:r>
+              <a:rPr lang="de-DE" sz="1200" dirty="0" err="1"/>
+              <a:t>freshbrewedcode.com</a:t>
+            </a:r>
+            <a:r>
+              <a:rPr lang="de-DE" sz="1200" dirty="0"/>
+              <a:t>/</a:t>
+            </a:r>
+            <a:r>
+              <a:rPr lang="de-DE" sz="1200" dirty="0" err="1"/>
+              <a:t>derekgreer</a:t>
+            </a:r>
+            <a:r>
+              <a:rPr lang="de-DE" sz="1200" dirty="0"/>
+              <a:t>/2011/11/28/</a:t>
+            </a:r>
+            <a:r>
+              <a:rPr lang="de-DE" sz="1200" dirty="0" err="1"/>
+              <a:t>getting</a:t>
+            </a:r>
+            <a:r>
+              <a:rPr lang="de-DE" sz="1200" dirty="0"/>
+              <a:t>-</a:t>
+            </a:r>
+            <a:r>
+              <a:rPr lang="de-DE" sz="1200" dirty="0" err="1"/>
+              <a:t>started</a:t>
+            </a:r>
+            <a:r>
+              <a:rPr lang="de-DE" sz="1200" dirty="0"/>
+              <a:t>-with-</a:t>
+            </a:r>
+            <a:r>
+              <a:rPr lang="de-DE" sz="1200" dirty="0" err="1"/>
+              <a:t>requirejs</a:t>
+            </a:r>
+            <a:r>
+              <a:rPr lang="de-DE" sz="1200" dirty="0"/>
+              <a:t>/</a:t>
+            </a:r>
+          </a:p>
+          <a:p>
+            <a:r>
+              <a:rPr lang="de-DE" dirty="0" err="1" smtClean="0"/>
+              <a:t>require</a:t>
+            </a:r>
+            <a:r>
+              <a:rPr lang="de-DE" dirty="0"/>
+              <a:t>(["</a:t>
+            </a:r>
+            <a:r>
+              <a:rPr lang="de-DE" dirty="0" err="1"/>
+              <a:t>customerModule</a:t>
+            </a:r>
+            <a:r>
+              <a:rPr lang="de-DE" dirty="0"/>
+              <a:t>", "</a:t>
+            </a:r>
+            <a:r>
+              <a:rPr lang="de-DE" dirty="0" err="1"/>
+              <a:t>orderModule</a:t>
+            </a:r>
+            <a:r>
+              <a:rPr lang="de-DE" dirty="0"/>
+              <a:t>"</a:t>
+            </a:r>
+            <a:r>
+              <a:rPr lang="de-DE" dirty="0" smtClean="0"/>
+              <a:t>], </a:t>
+            </a:r>
+            <a:r>
+              <a:rPr lang="de-DE" dirty="0" err="1"/>
+              <a:t>function</a:t>
+            </a:r>
+            <a:r>
+              <a:rPr lang="de-DE" dirty="0"/>
+              <a:t>(c, o) </a:t>
+            </a:r>
+            <a:r>
+              <a:rPr lang="de-DE" dirty="0" smtClean="0"/>
+              <a:t>{</a:t>
+            </a:r>
+            <a:endParaRPr lang="de-DE" dirty="0"/>
+          </a:p>
+          <a:p>
+            <a:r>
+              <a:rPr lang="de-DE" dirty="0"/>
+              <a:t>    var </a:t>
+            </a:r>
+            <a:r>
+              <a:rPr lang="de-DE" dirty="0" err="1"/>
+              <a:t>customers</a:t>
+            </a:r>
+            <a:r>
+              <a:rPr lang="de-DE" dirty="0"/>
+              <a:t> = </a:t>
+            </a:r>
+            <a:r>
+              <a:rPr lang="de-DE" dirty="0" err="1"/>
+              <a:t>c.getCustomers</a:t>
+            </a:r>
+            <a:r>
+              <a:rPr lang="de-DE" dirty="0"/>
+              <a:t>();</a:t>
+            </a:r>
+          </a:p>
+          <a:p>
+            <a:r>
+              <a:rPr lang="de-DE" dirty="0"/>
+              <a:t>    // do </a:t>
+            </a:r>
+            <a:r>
+              <a:rPr lang="de-DE" dirty="0" err="1"/>
+              <a:t>something</a:t>
+            </a:r>
+            <a:r>
+              <a:rPr lang="de-DE" dirty="0"/>
+              <a:t> with </a:t>
+            </a:r>
+            <a:r>
+              <a:rPr lang="de-DE" dirty="0" err="1"/>
+              <a:t>customers</a:t>
+            </a:r>
+            <a:r>
+              <a:rPr lang="de-DE" dirty="0"/>
+              <a:t> ...</a:t>
+            </a:r>
+          </a:p>
+          <a:p>
+            <a:endParaRPr lang="de-DE" dirty="0"/>
+          </a:p>
+          <a:p>
+            <a:r>
+              <a:rPr lang="de-DE" dirty="0"/>
+              <a:t>    var </a:t>
+            </a:r>
+            <a:r>
+              <a:rPr lang="de-DE" dirty="0" err="1"/>
+              <a:t>orders</a:t>
+            </a:r>
+            <a:r>
+              <a:rPr lang="de-DE" dirty="0"/>
+              <a:t> = </a:t>
+            </a:r>
+            <a:r>
+              <a:rPr lang="de-DE" dirty="0" err="1"/>
+              <a:t>o.getOrders</a:t>
+            </a:r>
+            <a:r>
+              <a:rPr lang="de-DE" dirty="0"/>
+              <a:t>();</a:t>
+            </a:r>
+          </a:p>
+          <a:p>
+            <a:r>
+              <a:rPr lang="de-DE" dirty="0"/>
+              <a:t>    // do </a:t>
+            </a:r>
+            <a:r>
+              <a:rPr lang="de-DE" dirty="0" err="1"/>
+              <a:t>something</a:t>
+            </a:r>
+            <a:r>
+              <a:rPr lang="de-DE" dirty="0"/>
+              <a:t> with </a:t>
+            </a:r>
+            <a:r>
+              <a:rPr lang="de-DE" dirty="0" err="1"/>
+              <a:t>orders</a:t>
+            </a:r>
+            <a:r>
+              <a:rPr lang="de-DE" dirty="0"/>
+              <a:t> ...    </a:t>
+            </a:r>
+          </a:p>
+          <a:p>
+            <a:r>
+              <a:rPr lang="de-DE" dirty="0"/>
+              <a:t>});</a:t>
+            </a:r>
+          </a:p>
+          <a:p>
+            <a:endParaRPr lang="de-DE" dirty="0"/>
+          </a:p>
+          <a:p>
+            <a:endParaRPr lang="de-DE" dirty="0"/>
+          </a:p>
+        </p:txBody>
+      </p:sp>
+      <p:sp>
+        <p:nvSpPr>
+          <p:cNvPr id="3" name="Titel 2"/>
+          <p:cNvSpPr>
+            <a:spLocks noGrp="1"/>
+          </p:cNvSpPr>
+          <p:nvPr>
+            <p:ph type="title"/>
+          </p:nvPr>
+        </p:nvSpPr>
+        <p:spPr/>
+        <p:txBody>
+          <a:bodyPr>
+            <a:normAutofit/>
+          </a:bodyPr>
+          <a:lstStyle/>
+          <a:p>
+            <a:r>
+              <a:rPr lang="de-DE" dirty="0" err="1" smtClean="0"/>
+              <a:t>Require</a:t>
+            </a:r>
+            <a:r>
+              <a:rPr lang="de-DE" dirty="0" smtClean="0"/>
+              <a:t> </a:t>
+            </a:r>
+            <a:r>
+              <a:rPr lang="de-DE" dirty="0"/>
+              <a:t>durch AMD (</a:t>
+            </a:r>
+            <a:r>
+              <a:rPr lang="de-DE" dirty="0" err="1"/>
+              <a:t>require.js</a:t>
+            </a:r>
+            <a:r>
+              <a:rPr lang="de-DE" dirty="0"/>
+              <a:t>)</a:t>
+            </a:r>
+          </a:p>
+        </p:txBody>
+      </p:sp>
+    </p:spTree>
+    <p:extLst>
+      <p:ext uri="{BB962C8B-B14F-4D97-AF65-F5344CB8AC3E}">
+        <p14:creationId xmlns:p14="http://schemas.microsoft.com/office/powerpoint/2010/main" val="3614526317"/>
+      </p:ext>
+    </p:extLst>
+  </p:cSld>
+  <p:clrMapOvr>
+    <a:masterClrMapping/>
+  </p:clrMapOvr>
+  <p:timing>
+    <p:tnLst>
+      <p:par>
+        <p:cTn xmlns:p14="http://schemas.microsoft.com/office/powerpoint/2010/main" id="1" dur="indefinite" restart="never" nodeType="tmRoot"/>
+      </p:par>
+    </p:tnLst>
+  </p:timing>
+</p:sld>
+</file>
+
+<file path=ppt/slides/slide61.xml><?xml version="1.0" encoding="utf-8"?>
 <p:sld xmlns:a="http://schemas.openxmlformats.org/drawingml/2006/main" xmlns:r="http://schemas.openxmlformats.org/officeDocument/2006/relationships" xmlns:p="http://schemas.openxmlformats.org/presentationml/2006/main">
   <p:cSld>
     <p:spTree>
@@ -16767,11 +17100,7 @@
           <a:p>
             <a:r>
               <a:rPr lang="de-DE" dirty="0" smtClean="0"/>
-              <a:t>Fazit Tag </a:t>
-            </a:r>
-            <a:r>
-              <a:rPr lang="de-DE" dirty="0" smtClean="0"/>
-              <a:t>2</a:t>
+              <a:t>Fazit Tag 2</a:t>
             </a:r>
             <a:endParaRPr lang="de-DE" dirty="0"/>
           </a:p>

</xml_diff>